<commit_message>
Initial front-end and docker code
</commit_message>
<xml_diff>
--- a/Using ColdFusion ORM.pptx
+++ b/Using ColdFusion ORM.pptx
@@ -8,6 +8,12 @@
     <p:sldId id="256" r:id="rId2"/>
     <p:sldId id="257" r:id="rId3"/>
     <p:sldId id="258" r:id="rId4"/>
+    <p:sldId id="259" r:id="rId5"/>
+    <p:sldId id="260" r:id="rId6"/>
+    <p:sldId id="261" r:id="rId7"/>
+    <p:sldId id="262" r:id="rId8"/>
+    <p:sldId id="263" r:id="rId9"/>
+    <p:sldId id="264" r:id="rId10"/>
   </p:sldIdLst>
   <p:sldSz cx="12192000" cy="6858000"/>
   <p:notesSz cx="6858000" cy="9144000"/>
@@ -3008,15 +3014,39 @@
               <a:rPr lang="en-US" dirty="0">
                 <a:hlinkClick r:id="rId2"/>
               </a:rPr>
-              <a:t>https://www.github.com/quetwo/orm-preso</a:t>
+              <a:t>https://github.com/quetwo/orm-preso</a:t>
             </a:r>
             <a:endParaRPr lang="en-US" dirty="0"/>
           </a:p>
           <a:p>
-            <a:endParaRPr lang="en-US"/>
-          </a:p>
-          <a:p>
-            <a:endParaRPr lang="en-US"/>
+            <a:pPr lvl="1"/>
+            <a:endParaRPr lang="en-US" dirty="0"/>
+          </a:p>
+          <a:p>
+            <a:r>
+              <a:rPr lang="en-US" dirty="0"/>
+              <a:t>This presentation assumes you have a passing knowledge of CFCs and basic CFML.   We will be using the </a:t>
+            </a:r>
+            <a:r>
+              <a:rPr lang="en-US" dirty="0" err="1"/>
+              <a:t>Lucee</a:t>
+            </a:r>
+            <a:r>
+              <a:rPr lang="en-US" dirty="0"/>
+              <a:t> engine and MySQL for our demos, but Adobe CF (version 9.1 and later) and other SQL engines will be nearly identical.</a:t>
+            </a:r>
+          </a:p>
+          <a:p>
+            <a:endParaRPr lang="en-US" dirty="0"/>
+          </a:p>
+          <a:p>
+            <a:r>
+              <a:rPr lang="en-US" dirty="0"/>
+              <a:t>This meeting will be recorded.  </a:t>
+            </a:r>
+          </a:p>
+          <a:p>
+            <a:endParaRPr lang="en-US" dirty="0"/>
           </a:p>
         </p:txBody>
       </p:sp>
@@ -3024,6 +3054,709 @@
     <p:extLst>
       <p:ext uri="{BB962C8B-B14F-4D97-AF65-F5344CB8AC3E}">
         <p14:creationId xmlns:p14="http://schemas.microsoft.com/office/powerpoint/2010/main" val="3285768562"/>
+      </p:ext>
+    </p:extLst>
+  </p:cSld>
+  <p:clrMapOvr>
+    <a:masterClrMapping/>
+  </p:clrMapOvr>
+</p:sld>
+</file>
+
+<file path=ppt/slides/slide4.xml><?xml version="1.0" encoding="utf-8"?>
+<p:sld xmlns:a="http://schemas.openxmlformats.org/drawingml/2006/main" xmlns:r="http://schemas.openxmlformats.org/officeDocument/2006/relationships" xmlns:p="http://schemas.openxmlformats.org/presentationml/2006/main">
+  <p:cSld>
+    <p:spTree>
+      <p:nvGrpSpPr>
+        <p:cNvPr id="1" name=""/>
+        <p:cNvGrpSpPr/>
+        <p:nvPr/>
+      </p:nvGrpSpPr>
+      <p:grpSpPr>
+        <a:xfrm>
+          <a:off x="0" y="0"/>
+          <a:ext cx="0" cy="0"/>
+          <a:chOff x="0" y="0"/>
+          <a:chExt cx="0" cy="0"/>
+        </a:xfrm>
+      </p:grpSpPr>
+      <p:sp>
+        <p:nvSpPr>
+          <p:cNvPr id="2" name="Title 1">
+            <a:extLst>
+              <a:ext uri="{FF2B5EF4-FFF2-40B4-BE49-F238E27FC236}">
+                <a16:creationId xmlns:a16="http://schemas.microsoft.com/office/drawing/2014/main" id="{42EC7050-BC47-4D3A-8052-66D0B281666D}"/>
+              </a:ext>
+            </a:extLst>
+          </p:cNvPr>
+          <p:cNvSpPr>
+            <a:spLocks noGrp="1"/>
+          </p:cNvSpPr>
+          <p:nvPr>
+            <p:ph type="title"/>
+          </p:nvPr>
+        </p:nvSpPr>
+        <p:spPr/>
+        <p:txBody>
+          <a:bodyPr/>
+          <a:lstStyle/>
+          <a:p>
+            <a:r>
+              <a:rPr lang="en-US" dirty="0"/>
+              <a:t>About Nick</a:t>
+            </a:r>
+          </a:p>
+        </p:txBody>
+      </p:sp>
+      <p:sp>
+        <p:nvSpPr>
+          <p:cNvPr id="3" name="Content Placeholder 2">
+            <a:extLst>
+              <a:ext uri="{FF2B5EF4-FFF2-40B4-BE49-F238E27FC236}">
+                <a16:creationId xmlns:a16="http://schemas.microsoft.com/office/drawing/2014/main" id="{B608C4D2-5E63-4E3A-AC35-681C154CDAE6}"/>
+              </a:ext>
+            </a:extLst>
+          </p:cNvPr>
+          <p:cNvSpPr>
+            <a:spLocks noGrp="1"/>
+          </p:cNvSpPr>
+          <p:nvPr>
+            <p:ph idx="1"/>
+          </p:nvPr>
+        </p:nvSpPr>
+        <p:spPr/>
+        <p:txBody>
+          <a:bodyPr/>
+          <a:lstStyle/>
+          <a:p>
+            <a:r>
+              <a:rPr lang="en-US" dirty="0"/>
+              <a:t>CF programmer since the mid 90’s – started with CF 4</a:t>
+            </a:r>
+          </a:p>
+          <a:p>
+            <a:r>
+              <a:rPr lang="en-US" dirty="0"/>
+              <a:t>Member of the Apache Foundation, and a committer to a few projects</a:t>
+            </a:r>
+          </a:p>
+          <a:p>
+            <a:r>
+              <a:rPr lang="en-US" dirty="0"/>
+              <a:t>MMCFUG member and contributor</a:t>
+            </a:r>
+          </a:p>
+          <a:p>
+            <a:endParaRPr lang="en-US" dirty="0"/>
+          </a:p>
+          <a:p>
+            <a:r>
+              <a:rPr lang="en-US" dirty="0"/>
+              <a:t>Adjunct Professor at Michigan State University in the College of Communication Arts and Sciences</a:t>
+            </a:r>
+          </a:p>
+          <a:p>
+            <a:r>
+              <a:rPr lang="en-US" dirty="0"/>
+              <a:t>Manager of the Unified Communications Team at Michigan State University</a:t>
+            </a:r>
+          </a:p>
+        </p:txBody>
+      </p:sp>
+    </p:spTree>
+    <p:extLst>
+      <p:ext uri="{BB962C8B-B14F-4D97-AF65-F5344CB8AC3E}">
+        <p14:creationId xmlns:p14="http://schemas.microsoft.com/office/powerpoint/2010/main" val="1647056012"/>
+      </p:ext>
+    </p:extLst>
+  </p:cSld>
+  <p:clrMapOvr>
+    <a:masterClrMapping/>
+  </p:clrMapOvr>
+</p:sld>
+</file>
+
+<file path=ppt/slides/slide5.xml><?xml version="1.0" encoding="utf-8"?>
+<p:sld xmlns:a="http://schemas.openxmlformats.org/drawingml/2006/main" xmlns:r="http://schemas.openxmlformats.org/officeDocument/2006/relationships" xmlns:p="http://schemas.openxmlformats.org/presentationml/2006/main">
+  <p:cSld>
+    <p:spTree>
+      <p:nvGrpSpPr>
+        <p:cNvPr id="1" name=""/>
+        <p:cNvGrpSpPr/>
+        <p:nvPr/>
+      </p:nvGrpSpPr>
+      <p:grpSpPr>
+        <a:xfrm>
+          <a:off x="0" y="0"/>
+          <a:ext cx="0" cy="0"/>
+          <a:chOff x="0" y="0"/>
+          <a:chExt cx="0" cy="0"/>
+        </a:xfrm>
+      </p:grpSpPr>
+      <p:sp>
+        <p:nvSpPr>
+          <p:cNvPr id="4" name="Title 3">
+            <a:extLst>
+              <a:ext uri="{FF2B5EF4-FFF2-40B4-BE49-F238E27FC236}">
+                <a16:creationId xmlns:a16="http://schemas.microsoft.com/office/drawing/2014/main" id="{A983F497-E090-4AF7-B888-87F6569739BE}"/>
+              </a:ext>
+            </a:extLst>
+          </p:cNvPr>
+          <p:cNvSpPr>
+            <a:spLocks noGrp="1"/>
+          </p:cNvSpPr>
+          <p:nvPr>
+            <p:ph type="title"/>
+          </p:nvPr>
+        </p:nvSpPr>
+        <p:spPr/>
+        <p:txBody>
+          <a:bodyPr/>
+          <a:lstStyle/>
+          <a:p>
+            <a:r>
+              <a:rPr lang="en-US" dirty="0"/>
+              <a:t>What is ORM</a:t>
+            </a:r>
+          </a:p>
+        </p:txBody>
+      </p:sp>
+      <p:sp>
+        <p:nvSpPr>
+          <p:cNvPr id="5" name="Text Placeholder 4">
+            <a:extLst>
+              <a:ext uri="{FF2B5EF4-FFF2-40B4-BE49-F238E27FC236}">
+                <a16:creationId xmlns:a16="http://schemas.microsoft.com/office/drawing/2014/main" id="{5751667A-D992-4C0F-991E-5A592EC8FA57}"/>
+              </a:ext>
+            </a:extLst>
+          </p:cNvPr>
+          <p:cNvSpPr>
+            <a:spLocks noGrp="1"/>
+          </p:cNvSpPr>
+          <p:nvPr>
+            <p:ph type="body" idx="1"/>
+          </p:nvPr>
+        </p:nvSpPr>
+        <p:spPr/>
+        <p:txBody>
+          <a:bodyPr/>
+          <a:lstStyle/>
+          <a:p>
+            <a:endParaRPr lang="en-US"/>
+          </a:p>
+        </p:txBody>
+      </p:sp>
+    </p:spTree>
+    <p:extLst>
+      <p:ext uri="{BB962C8B-B14F-4D97-AF65-F5344CB8AC3E}">
+        <p14:creationId xmlns:p14="http://schemas.microsoft.com/office/powerpoint/2010/main" val="2994410301"/>
+      </p:ext>
+    </p:extLst>
+  </p:cSld>
+  <p:clrMapOvr>
+    <a:masterClrMapping/>
+  </p:clrMapOvr>
+</p:sld>
+</file>
+
+<file path=ppt/slides/slide6.xml><?xml version="1.0" encoding="utf-8"?>
+<p:sld xmlns:a="http://schemas.openxmlformats.org/drawingml/2006/main" xmlns:r="http://schemas.openxmlformats.org/officeDocument/2006/relationships" xmlns:p="http://schemas.openxmlformats.org/presentationml/2006/main">
+  <p:cSld>
+    <p:spTree>
+      <p:nvGrpSpPr>
+        <p:cNvPr id="1" name=""/>
+        <p:cNvGrpSpPr/>
+        <p:nvPr/>
+      </p:nvGrpSpPr>
+      <p:grpSpPr>
+        <a:xfrm>
+          <a:off x="0" y="0"/>
+          <a:ext cx="0" cy="0"/>
+          <a:chOff x="0" y="0"/>
+          <a:chExt cx="0" cy="0"/>
+        </a:xfrm>
+      </p:grpSpPr>
+      <p:sp>
+        <p:nvSpPr>
+          <p:cNvPr id="4" name="Title 3">
+            <a:extLst>
+              <a:ext uri="{FF2B5EF4-FFF2-40B4-BE49-F238E27FC236}">
+                <a16:creationId xmlns:a16="http://schemas.microsoft.com/office/drawing/2014/main" id="{0A45883D-8F3D-4039-87B8-960BA2B52FB5}"/>
+              </a:ext>
+            </a:extLst>
+          </p:cNvPr>
+          <p:cNvSpPr>
+            <a:spLocks noGrp="1"/>
+          </p:cNvSpPr>
+          <p:nvPr>
+            <p:ph type="title"/>
+          </p:nvPr>
+        </p:nvSpPr>
+        <p:spPr/>
+        <p:txBody>
+          <a:bodyPr/>
+          <a:lstStyle/>
+          <a:p>
+            <a:r>
+              <a:rPr lang="en-US" dirty="0"/>
+              <a:t>What is an ORM?</a:t>
+            </a:r>
+          </a:p>
+        </p:txBody>
+      </p:sp>
+      <p:sp>
+        <p:nvSpPr>
+          <p:cNvPr id="5" name="Content Placeholder 4">
+            <a:extLst>
+              <a:ext uri="{FF2B5EF4-FFF2-40B4-BE49-F238E27FC236}">
+                <a16:creationId xmlns:a16="http://schemas.microsoft.com/office/drawing/2014/main" id="{7DCDE74A-F4DC-45BA-891F-0C51FE15B354}"/>
+              </a:ext>
+            </a:extLst>
+          </p:cNvPr>
+          <p:cNvSpPr>
+            <a:spLocks noGrp="1"/>
+          </p:cNvSpPr>
+          <p:nvPr>
+            <p:ph idx="1"/>
+          </p:nvPr>
+        </p:nvSpPr>
+        <p:spPr/>
+        <p:txBody>
+          <a:bodyPr/>
+          <a:lstStyle/>
+          <a:p>
+            <a:r>
+              <a:rPr lang="en-US" dirty="0"/>
+              <a:t>An ORM = Object Relation Manager</a:t>
+            </a:r>
+          </a:p>
+          <a:p>
+            <a:pPr lvl="1"/>
+            <a:r>
+              <a:rPr lang="en-US" dirty="0"/>
+              <a:t>A system that manages the database layer within code.</a:t>
+            </a:r>
+          </a:p>
+          <a:p>
+            <a:pPr lvl="1"/>
+            <a:r>
+              <a:rPr lang="en-US" dirty="0"/>
+              <a:t>Classes (or components in CF’s case) are directly translated to the database by an ORM.  A database will have a table that represents a class in code.  A row in the database represents an </a:t>
+            </a:r>
+            <a:r>
+              <a:rPr lang="en-US" i="1" dirty="0"/>
+              <a:t>instance</a:t>
+            </a:r>
+            <a:r>
+              <a:rPr lang="en-US" dirty="0"/>
+              <a:t> of the class.</a:t>
+            </a:r>
+          </a:p>
+          <a:p>
+            <a:pPr lvl="2"/>
+            <a:r>
+              <a:rPr lang="en-US" dirty="0"/>
+              <a:t>1,000ft view – this means that each </a:t>
+            </a:r>
+            <a:r>
+              <a:rPr lang="en-US" i="1" dirty="0"/>
+              <a:t>instance</a:t>
+            </a:r>
+            <a:r>
+              <a:rPr lang="en-US" dirty="0"/>
+              <a:t> of this class is </a:t>
+            </a:r>
+            <a:r>
+              <a:rPr lang="en-US" b="1" i="1" dirty="0"/>
+              <a:t>persisted</a:t>
+            </a:r>
+            <a:r>
+              <a:rPr lang="en-US" dirty="0"/>
+              <a:t> not only in memory, but in a database.  </a:t>
+            </a:r>
+          </a:p>
+          <a:p>
+            <a:pPr lvl="1"/>
+            <a:endParaRPr lang="en-US" dirty="0"/>
+          </a:p>
+          <a:p>
+            <a:pPr lvl="1"/>
+            <a:r>
+              <a:rPr lang="en-US" dirty="0"/>
+              <a:t>A quick benefit – you no longer need to write SQL.  The ORM writes the SQL for you.</a:t>
+            </a:r>
+          </a:p>
+          <a:p>
+            <a:pPr lvl="1"/>
+            <a:r>
+              <a:rPr lang="en-US" dirty="0"/>
+              <a:t>You no longer have to worry about SQL dialects – making your code much more portable across servers and platforms.</a:t>
+            </a:r>
+          </a:p>
+        </p:txBody>
+      </p:sp>
+    </p:spTree>
+    <p:extLst>
+      <p:ext uri="{BB962C8B-B14F-4D97-AF65-F5344CB8AC3E}">
+        <p14:creationId xmlns:p14="http://schemas.microsoft.com/office/powerpoint/2010/main" val="2590307844"/>
+      </p:ext>
+    </p:extLst>
+  </p:cSld>
+  <p:clrMapOvr>
+    <a:masterClrMapping/>
+  </p:clrMapOvr>
+</p:sld>
+</file>
+
+<file path=ppt/slides/slide7.xml><?xml version="1.0" encoding="utf-8"?>
+<p:sld xmlns:a="http://schemas.openxmlformats.org/drawingml/2006/main" xmlns:r="http://schemas.openxmlformats.org/officeDocument/2006/relationships" xmlns:p="http://schemas.openxmlformats.org/presentationml/2006/main">
+  <p:cSld>
+    <p:spTree>
+      <p:nvGrpSpPr>
+        <p:cNvPr id="1" name=""/>
+        <p:cNvGrpSpPr/>
+        <p:nvPr/>
+      </p:nvGrpSpPr>
+      <p:grpSpPr>
+        <a:xfrm>
+          <a:off x="0" y="0"/>
+          <a:ext cx="0" cy="0"/>
+          <a:chOff x="0" y="0"/>
+          <a:chExt cx="0" cy="0"/>
+        </a:xfrm>
+      </p:grpSpPr>
+      <p:sp>
+        <p:nvSpPr>
+          <p:cNvPr id="2" name="Title 1">
+            <a:extLst>
+              <a:ext uri="{FF2B5EF4-FFF2-40B4-BE49-F238E27FC236}">
+                <a16:creationId xmlns:a16="http://schemas.microsoft.com/office/drawing/2014/main" id="{056A90D5-A30B-4A10-888B-6B1BC37C83A6}"/>
+              </a:ext>
+            </a:extLst>
+          </p:cNvPr>
+          <p:cNvSpPr>
+            <a:spLocks noGrp="1"/>
+          </p:cNvSpPr>
+          <p:nvPr>
+            <p:ph type="title"/>
+          </p:nvPr>
+        </p:nvSpPr>
+        <p:spPr/>
+        <p:txBody>
+          <a:bodyPr/>
+          <a:lstStyle/>
+          <a:p>
+            <a:r>
+              <a:rPr lang="en-US" dirty="0"/>
+              <a:t>What is an ORM?</a:t>
+            </a:r>
+          </a:p>
+        </p:txBody>
+      </p:sp>
+      <p:sp>
+        <p:nvSpPr>
+          <p:cNvPr id="3" name="Content Placeholder 2">
+            <a:extLst>
+              <a:ext uri="{FF2B5EF4-FFF2-40B4-BE49-F238E27FC236}">
+                <a16:creationId xmlns:a16="http://schemas.microsoft.com/office/drawing/2014/main" id="{690FE37F-16CC-4A2A-A71F-EF963167F6ED}"/>
+              </a:ext>
+            </a:extLst>
+          </p:cNvPr>
+          <p:cNvSpPr>
+            <a:spLocks noGrp="1"/>
+          </p:cNvSpPr>
+          <p:nvPr>
+            <p:ph idx="1"/>
+          </p:nvPr>
+        </p:nvSpPr>
+        <p:spPr/>
+        <p:txBody>
+          <a:bodyPr/>
+          <a:lstStyle/>
+          <a:p>
+            <a:r>
+              <a:rPr lang="en-US" dirty="0"/>
+              <a:t>ORM technologies built on Java Hibernate have been built in to the CFML language since 2010.</a:t>
+            </a:r>
+          </a:p>
+          <a:p>
+            <a:pPr lvl="1"/>
+            <a:r>
+              <a:rPr lang="en-US" dirty="0"/>
+              <a:t>Adobe ColdFusion 9  (really 9.0.2)</a:t>
+            </a:r>
+          </a:p>
+          <a:p>
+            <a:pPr lvl="1"/>
+            <a:r>
+              <a:rPr lang="en-US" dirty="0"/>
+              <a:t>All versions of </a:t>
+            </a:r>
+            <a:r>
+              <a:rPr lang="en-US" dirty="0" err="1"/>
+              <a:t>Lucee</a:t>
+            </a:r>
+            <a:r>
+              <a:rPr lang="en-US" dirty="0"/>
+              <a:t> &amp; </a:t>
+            </a:r>
+            <a:r>
+              <a:rPr lang="en-US" dirty="0" err="1"/>
+              <a:t>Railo</a:t>
+            </a:r>
+            <a:endParaRPr lang="en-US" dirty="0"/>
+          </a:p>
+          <a:p>
+            <a:pPr lvl="1"/>
+            <a:r>
+              <a:rPr lang="en-US" dirty="0"/>
+              <a:t>No external frameworks or dependencies required to use. </a:t>
+            </a:r>
+          </a:p>
+          <a:p>
+            <a:pPr lvl="1"/>
+            <a:endParaRPr lang="en-US" dirty="0"/>
+          </a:p>
+          <a:p>
+            <a:r>
+              <a:rPr lang="en-US" dirty="0"/>
+              <a:t>There are 3</a:t>
+            </a:r>
+            <a:r>
+              <a:rPr lang="en-US" baseline="30000" dirty="0"/>
+              <a:t>rd</a:t>
+            </a:r>
+            <a:r>
+              <a:rPr lang="en-US" dirty="0"/>
+              <a:t> party ORM systems available in CF as well.</a:t>
+            </a:r>
+          </a:p>
+          <a:p>
+            <a:pPr lvl="1"/>
+            <a:r>
+              <a:rPr lang="en-US" dirty="0" err="1"/>
+              <a:t>ColdBox</a:t>
+            </a:r>
+            <a:r>
+              <a:rPr lang="en-US" dirty="0"/>
+              <a:t> ORM</a:t>
+            </a:r>
+          </a:p>
+          <a:p>
+            <a:pPr lvl="1"/>
+            <a:r>
+              <a:rPr lang="en-US" dirty="0"/>
+              <a:t>Mura CMS ORM</a:t>
+            </a:r>
+          </a:p>
+        </p:txBody>
+      </p:sp>
+    </p:spTree>
+    <p:extLst>
+      <p:ext uri="{BB962C8B-B14F-4D97-AF65-F5344CB8AC3E}">
+        <p14:creationId xmlns:p14="http://schemas.microsoft.com/office/powerpoint/2010/main" val="1813279715"/>
+      </p:ext>
+    </p:extLst>
+  </p:cSld>
+  <p:clrMapOvr>
+    <a:masterClrMapping/>
+  </p:clrMapOvr>
+</p:sld>
+</file>
+
+<file path=ppt/slides/slide8.xml><?xml version="1.0" encoding="utf-8"?>
+<p:sld xmlns:a="http://schemas.openxmlformats.org/drawingml/2006/main" xmlns:r="http://schemas.openxmlformats.org/officeDocument/2006/relationships" xmlns:p="http://schemas.openxmlformats.org/presentationml/2006/main">
+  <p:cSld>
+    <p:spTree>
+      <p:nvGrpSpPr>
+        <p:cNvPr id="1" name=""/>
+        <p:cNvGrpSpPr/>
+        <p:nvPr/>
+      </p:nvGrpSpPr>
+      <p:grpSpPr>
+        <a:xfrm>
+          <a:off x="0" y="0"/>
+          <a:ext cx="0" cy="0"/>
+          <a:chOff x="0" y="0"/>
+          <a:chExt cx="0" cy="0"/>
+        </a:xfrm>
+      </p:grpSpPr>
+      <p:sp>
+        <p:nvSpPr>
+          <p:cNvPr id="4" name="Title 3">
+            <a:extLst>
+              <a:ext uri="{FF2B5EF4-FFF2-40B4-BE49-F238E27FC236}">
+                <a16:creationId xmlns:a16="http://schemas.microsoft.com/office/drawing/2014/main" id="{A3830B42-1D28-4EDD-BF2B-85F320DC8110}"/>
+              </a:ext>
+            </a:extLst>
+          </p:cNvPr>
+          <p:cNvSpPr>
+            <a:spLocks noGrp="1"/>
+          </p:cNvSpPr>
+          <p:nvPr>
+            <p:ph type="title"/>
+          </p:nvPr>
+        </p:nvSpPr>
+        <p:spPr/>
+        <p:txBody>
+          <a:bodyPr/>
+          <a:lstStyle/>
+          <a:p>
+            <a:r>
+              <a:rPr lang="en-US" dirty="0"/>
+              <a:t>Basics of Scaffolding</a:t>
+            </a:r>
+          </a:p>
+        </p:txBody>
+      </p:sp>
+      <p:sp>
+        <p:nvSpPr>
+          <p:cNvPr id="5" name="Text Placeholder 4">
+            <a:extLst>
+              <a:ext uri="{FF2B5EF4-FFF2-40B4-BE49-F238E27FC236}">
+                <a16:creationId xmlns:a16="http://schemas.microsoft.com/office/drawing/2014/main" id="{C1C09C3B-3DBC-4BE8-BE60-259EEBBA6499}"/>
+              </a:ext>
+            </a:extLst>
+          </p:cNvPr>
+          <p:cNvSpPr>
+            <a:spLocks noGrp="1"/>
+          </p:cNvSpPr>
+          <p:nvPr>
+            <p:ph type="body" idx="1"/>
+          </p:nvPr>
+        </p:nvSpPr>
+        <p:spPr/>
+        <p:txBody>
+          <a:bodyPr/>
+          <a:lstStyle/>
+          <a:p>
+            <a:endParaRPr lang="en-US"/>
+          </a:p>
+        </p:txBody>
+      </p:sp>
+    </p:spTree>
+    <p:extLst>
+      <p:ext uri="{BB962C8B-B14F-4D97-AF65-F5344CB8AC3E}">
+        <p14:creationId xmlns:p14="http://schemas.microsoft.com/office/powerpoint/2010/main" val="2684004414"/>
+      </p:ext>
+    </p:extLst>
+  </p:cSld>
+  <p:clrMapOvr>
+    <a:masterClrMapping/>
+  </p:clrMapOvr>
+</p:sld>
+</file>
+
+<file path=ppt/slides/slide9.xml><?xml version="1.0" encoding="utf-8"?>
+<p:sld xmlns:a="http://schemas.openxmlformats.org/drawingml/2006/main" xmlns:r="http://schemas.openxmlformats.org/officeDocument/2006/relationships" xmlns:p="http://schemas.openxmlformats.org/presentationml/2006/main">
+  <p:cSld>
+    <p:spTree>
+      <p:nvGrpSpPr>
+        <p:cNvPr id="1" name=""/>
+        <p:cNvGrpSpPr/>
+        <p:nvPr/>
+      </p:nvGrpSpPr>
+      <p:grpSpPr>
+        <a:xfrm>
+          <a:off x="0" y="0"/>
+          <a:ext cx="0" cy="0"/>
+          <a:chOff x="0" y="0"/>
+          <a:chExt cx="0" cy="0"/>
+        </a:xfrm>
+      </p:grpSpPr>
+      <p:sp>
+        <p:nvSpPr>
+          <p:cNvPr id="4" name="Title 3">
+            <a:extLst>
+              <a:ext uri="{FF2B5EF4-FFF2-40B4-BE49-F238E27FC236}">
+                <a16:creationId xmlns:a16="http://schemas.microsoft.com/office/drawing/2014/main" id="{C139B17E-5F03-4253-AF2E-0EB67DF75E4C}"/>
+              </a:ext>
+            </a:extLst>
+          </p:cNvPr>
+          <p:cNvSpPr>
+            <a:spLocks noGrp="1"/>
+          </p:cNvSpPr>
+          <p:nvPr>
+            <p:ph type="title"/>
+          </p:nvPr>
+        </p:nvSpPr>
+        <p:spPr/>
+        <p:txBody>
+          <a:bodyPr/>
+          <a:lstStyle/>
+          <a:p>
+            <a:r>
+              <a:rPr lang="en-US" dirty="0"/>
+              <a:t>Basics of Scaffolding</a:t>
+            </a:r>
+          </a:p>
+        </p:txBody>
+      </p:sp>
+      <p:sp>
+        <p:nvSpPr>
+          <p:cNvPr id="5" name="Content Placeholder 4">
+            <a:extLst>
+              <a:ext uri="{FF2B5EF4-FFF2-40B4-BE49-F238E27FC236}">
+                <a16:creationId xmlns:a16="http://schemas.microsoft.com/office/drawing/2014/main" id="{0D37A24A-A4DC-4773-BB39-2805ABDE8273}"/>
+              </a:ext>
+            </a:extLst>
+          </p:cNvPr>
+          <p:cNvSpPr>
+            <a:spLocks noGrp="1"/>
+          </p:cNvSpPr>
+          <p:nvPr>
+            <p:ph idx="1"/>
+          </p:nvPr>
+        </p:nvSpPr>
+        <p:spPr/>
+        <p:txBody>
+          <a:bodyPr/>
+          <a:lstStyle/>
+          <a:p>
+            <a:r>
+              <a:rPr lang="en-US" dirty="0"/>
+              <a:t>Scaffolding == Creating your DB layout via code.</a:t>
+            </a:r>
+          </a:p>
+          <a:p>
+            <a:pPr lvl="1"/>
+            <a:r>
+              <a:rPr lang="en-US" dirty="0"/>
+              <a:t>You start with your CF Components and have CF create the database to match it.</a:t>
+            </a:r>
+          </a:p>
+          <a:p>
+            <a:pPr lvl="2"/>
+            <a:r>
+              <a:rPr lang="en-US" dirty="0"/>
+              <a:t>All properties, indexing, etc. are all done for you.  You won’t care about the back-end DB type</a:t>
+            </a:r>
+          </a:p>
+          <a:p>
+            <a:pPr lvl="1"/>
+            <a:endParaRPr lang="en-US" dirty="0"/>
+          </a:p>
+          <a:p>
+            <a:r>
+              <a:rPr lang="en-US" dirty="0"/>
+              <a:t>Setting up the CF ORM is done in the </a:t>
+            </a:r>
+            <a:r>
+              <a:rPr lang="en-US" dirty="0" err="1"/>
+              <a:t>application.cfc</a:t>
+            </a:r>
+            <a:endParaRPr lang="en-US"/>
+          </a:p>
+          <a:p>
+            <a:pPr lvl="1"/>
+            <a:endParaRPr lang="en-US"/>
+          </a:p>
+        </p:txBody>
+      </p:sp>
+    </p:spTree>
+    <p:extLst>
+      <p:ext uri="{BB962C8B-B14F-4D97-AF65-F5344CB8AC3E}">
+        <p14:creationId xmlns:p14="http://schemas.microsoft.com/office/powerpoint/2010/main" val="2278511290"/>
       </p:ext>
     </p:extLst>
   </p:cSld>

</xml_diff>

<commit_message>
Updating PPT and Readme for demos.
</commit_message>
<xml_diff>
--- a/Using ColdFusion ORM.pptx
+++ b/Using ColdFusion ORM.pptx
@@ -14,13 +14,21 @@
     <p:sldId id="262" r:id="rId8"/>
     <p:sldId id="263" r:id="rId9"/>
     <p:sldId id="264" r:id="rId10"/>
-    <p:sldId id="265" r:id="rId11"/>
-    <p:sldId id="269" r:id="rId12"/>
-    <p:sldId id="266" r:id="rId13"/>
-    <p:sldId id="267" r:id="rId14"/>
-    <p:sldId id="268" r:id="rId15"/>
-    <p:sldId id="270" r:id="rId16"/>
-    <p:sldId id="271" r:id="rId17"/>
+    <p:sldId id="272" r:id="rId11"/>
+    <p:sldId id="265" r:id="rId12"/>
+    <p:sldId id="273" r:id="rId13"/>
+    <p:sldId id="269" r:id="rId14"/>
+    <p:sldId id="274" r:id="rId15"/>
+    <p:sldId id="266" r:id="rId16"/>
+    <p:sldId id="267" r:id="rId17"/>
+    <p:sldId id="268" r:id="rId18"/>
+    <p:sldId id="275" r:id="rId19"/>
+    <p:sldId id="276" r:id="rId20"/>
+    <p:sldId id="278" r:id="rId21"/>
+    <p:sldId id="279" r:id="rId22"/>
+    <p:sldId id="277" r:id="rId23"/>
+    <p:sldId id="270" r:id="rId24"/>
+    <p:sldId id="271" r:id="rId25"/>
   </p:sldIdLst>
   <p:sldSz cx="12192000" cy="6858000"/>
   <p:notesSz cx="6858000" cy="9144000"/>
@@ -1194,7 +1202,7 @@
           <a:p>
             <a:fld id="{7B268192-F4A8-45E6-A8AD-C84EF33EB0C9}" type="datetimeFigureOut">
               <a:rPr lang="en-US" smtClean="0"/>
-              <a:t>4/19/2022</a:t>
+              <a:t>4/29/2022</a:t>
             </a:fld>
             <a:endParaRPr lang="en-US"/>
           </a:p>
@@ -1362,7 +1370,7 @@
           <a:p>
             <a:fld id="{7B268192-F4A8-45E6-A8AD-C84EF33EB0C9}" type="datetimeFigureOut">
               <a:rPr lang="en-US" smtClean="0"/>
-              <a:t>4/19/2022</a:t>
+              <a:t>4/29/2022</a:t>
             </a:fld>
             <a:endParaRPr lang="en-US"/>
           </a:p>
@@ -1475,7 +1483,7 @@
           <a:p>
             <a:fld id="{7B268192-F4A8-45E6-A8AD-C84EF33EB0C9}" type="datetimeFigureOut">
               <a:rPr lang="en-US" smtClean="0"/>
-              <a:t>4/19/2022</a:t>
+              <a:t>4/29/2022</a:t>
             </a:fld>
             <a:endParaRPr lang="en-US"/>
           </a:p>
@@ -1786,7 +1794,7 @@
           <a:p>
             <a:fld id="{7B268192-F4A8-45E6-A8AD-C84EF33EB0C9}" type="datetimeFigureOut">
               <a:rPr lang="en-US" smtClean="0"/>
-              <a:t>4/19/2022</a:t>
+              <a:t>4/29/2022</a:t>
             </a:fld>
             <a:endParaRPr lang="en-US"/>
           </a:p>
@@ -2077,7 +2085,7 @@
           <a:p>
             <a:fld id="{7B268192-F4A8-45E6-A8AD-C84EF33EB0C9}" type="datetimeFigureOut">
               <a:rPr lang="en-US" smtClean="0"/>
-              <a:t>4/19/2022</a:t>
+              <a:t>4/29/2022</a:t>
             </a:fld>
             <a:endParaRPr lang="en-US"/>
           </a:p>
@@ -2318,7 +2326,7 @@
           <a:p>
             <a:fld id="{7B268192-F4A8-45E6-A8AD-C84EF33EB0C9}" type="datetimeFigureOut">
               <a:rPr lang="en-US" smtClean="0"/>
-              <a:t>4/19/2022</a:t>
+              <a:t>4/29/2022</a:t>
             </a:fld>
             <a:endParaRPr lang="en-US"/>
           </a:p>
@@ -2844,7 +2852,7 @@
           <p:cNvPr id="2" name="Title 1">
             <a:extLst>
               <a:ext uri="{FF2B5EF4-FFF2-40B4-BE49-F238E27FC236}">
-                <a16:creationId xmlns:a16="http://schemas.microsoft.com/office/drawing/2014/main" id="{C4FFEA92-4E68-49C0-8A1F-4CFC9DDB317C}"/>
+                <a16:creationId xmlns:a16="http://schemas.microsoft.com/office/drawing/2014/main" id="{6D07AB7A-D420-461C-BB6A-2405C78C9867}"/>
               </a:ext>
             </a:extLst>
           </p:cNvPr>
@@ -2862,71 +2870,44 @@
           <a:p>
             <a:r>
               <a:rPr lang="en-US" dirty="0"/>
-              <a:t>Setup the Components</a:t>
-            </a:r>
-          </a:p>
-        </p:txBody>
-      </p:sp>
-      <p:sp>
-        <p:nvSpPr>
-          <p:cNvPr id="3" name="Content Placeholder 2">
-            <a:extLst>
-              <a:ext uri="{FF2B5EF4-FFF2-40B4-BE49-F238E27FC236}">
-                <a16:creationId xmlns:a16="http://schemas.microsoft.com/office/drawing/2014/main" id="{6028994A-0672-4F2B-AA63-8F86A5D53344}"/>
-              </a:ext>
-            </a:extLst>
-          </p:cNvPr>
-          <p:cNvSpPr>
-            <a:spLocks noGrp="1"/>
-          </p:cNvSpPr>
+              <a:t>Basics of Scaffolding</a:t>
+            </a:r>
+          </a:p>
+        </p:txBody>
+      </p:sp>
+      <p:pic>
+        <p:nvPicPr>
+          <p:cNvPr id="5" name="Content Placeholder 4">
+            <a:extLst>
+              <a:ext uri="{FF2B5EF4-FFF2-40B4-BE49-F238E27FC236}">
+                <a16:creationId xmlns:a16="http://schemas.microsoft.com/office/drawing/2014/main" id="{A81CC9D8-27FB-4383-BC5B-BD92E828AB56}"/>
+              </a:ext>
+            </a:extLst>
+          </p:cNvPr>
+          <p:cNvPicPr>
+            <a:picLocks noGrp="1" noChangeAspect="1"/>
+          </p:cNvPicPr>
           <p:nvPr>
             <p:ph idx="1"/>
           </p:nvPr>
-        </p:nvSpPr>
-        <p:spPr/>
-        <p:txBody>
-          <a:bodyPr/>
-          <a:lstStyle/>
-          <a:p>
-            <a:r>
-              <a:rPr lang="en-US" dirty="0"/>
-              <a:t>Once ORM is enabled in your application, you need to define some CFCs to take advantage of it.</a:t>
-            </a:r>
-          </a:p>
-          <a:p>
-            <a:pPr lvl="1"/>
-            <a:endParaRPr lang="en-US" dirty="0"/>
-          </a:p>
-          <a:p>
-            <a:pPr lvl="1"/>
-            <a:r>
-              <a:rPr lang="en-US" dirty="0"/>
-              <a:t>New property on the CFC to tell the ORM engine that you want to ‘persist’ the component in the database.</a:t>
-            </a:r>
-          </a:p>
-          <a:p>
-            <a:pPr lvl="1"/>
-            <a:r>
-              <a:rPr lang="en-US" dirty="0"/>
-              <a:t>Need to define the properties and give metadata as to what you plan on storing in them.  These create automatic getter/setter functions for you.</a:t>
-            </a:r>
-          </a:p>
-          <a:p>
-            <a:pPr lvl="1"/>
-            <a:endParaRPr lang="en-US" dirty="0"/>
-          </a:p>
-          <a:p>
-            <a:r>
-              <a:rPr lang="en-US" dirty="0"/>
-              <a:t>Once you have these done, everything is wired up for you to write data to the database!</a:t>
-            </a:r>
-          </a:p>
-        </p:txBody>
-      </p:sp>
+        </p:nvPicPr>
+        <p:blipFill>
+          <a:blip r:embed="rId2"/>
+          <a:stretch>
+            <a:fillRect/>
+          </a:stretch>
+        </p:blipFill>
+        <p:spPr>
+          <a:xfrm>
+            <a:off x="238125" y="1586287"/>
+            <a:ext cx="10561638" cy="4037850"/>
+          </a:xfrm>
+        </p:spPr>
+      </p:pic>
     </p:spTree>
     <p:extLst>
       <p:ext uri="{BB962C8B-B14F-4D97-AF65-F5344CB8AC3E}">
-        <p14:creationId xmlns:p14="http://schemas.microsoft.com/office/powerpoint/2010/main" val="694632555"/>
+        <p14:creationId xmlns:p14="http://schemas.microsoft.com/office/powerpoint/2010/main" val="1176762703"/>
       </p:ext>
     </p:extLst>
   </p:cSld>
@@ -2958,7 +2939,7 @@
           <p:cNvPr id="2" name="Title 1">
             <a:extLst>
               <a:ext uri="{FF2B5EF4-FFF2-40B4-BE49-F238E27FC236}">
-                <a16:creationId xmlns:a16="http://schemas.microsoft.com/office/drawing/2014/main" id="{E36813A3-EE69-45A5-B3F0-9FC4FABBFB2C}"/>
+                <a16:creationId xmlns:a16="http://schemas.microsoft.com/office/drawing/2014/main" id="{C4FFEA92-4E68-49C0-8A1F-4CFC9DDB317C}"/>
               </a:ext>
             </a:extLst>
           </p:cNvPr>
@@ -2986,7 +2967,7 @@
           <p:cNvPr id="3" name="Content Placeholder 2">
             <a:extLst>
               <a:ext uri="{FF2B5EF4-FFF2-40B4-BE49-F238E27FC236}">
-                <a16:creationId xmlns:a16="http://schemas.microsoft.com/office/drawing/2014/main" id="{C6723F11-74F9-452A-B538-F3246C33C99F}"/>
+                <a16:creationId xmlns:a16="http://schemas.microsoft.com/office/drawing/2014/main" id="{6028994A-0672-4F2B-AA63-8F86A5D53344}"/>
               </a:ext>
             </a:extLst>
           </p:cNvPr>
@@ -2999,103 +2980,48 @@
         </p:nvSpPr>
         <p:spPr/>
         <p:txBody>
-          <a:bodyPr>
-            <a:normAutofit fontScale="92500"/>
-          </a:bodyPr>
-          <a:lstStyle/>
-          <a:p>
-            <a:r>
-              <a:rPr lang="en-US" dirty="0"/>
-              <a:t>Your key field for the DB.</a:t>
+          <a:bodyPr/>
+          <a:lstStyle/>
+          <a:p>
+            <a:r>
+              <a:rPr lang="en-US" dirty="0"/>
+              <a:t>Once ORM is enabled in your application, you need to define some CFCs to take advantage of it.</a:t>
             </a:r>
           </a:p>
           <a:p>
             <a:pPr lvl="1"/>
-            <a:r>
-              <a:rPr lang="en-US" dirty="0"/>
-              <a:t>Field type of ‘id’.  You will need to specify the ‘generator’</a:t>
-            </a:r>
-          </a:p>
-          <a:p>
-            <a:pPr lvl="2"/>
-            <a:r>
-              <a:rPr lang="en-US" dirty="0"/>
-              <a:t>Most DBs you can use ‘native’.  This will tell hibernate to pick the best way to setup a key field, based on the DB type.</a:t>
-            </a:r>
-          </a:p>
-          <a:p>
-            <a:pPr lvl="2"/>
-            <a:r>
-              <a:rPr lang="en-US" dirty="0"/>
-              <a:t>Other generators also exist, including ones that will auto-increment, increment manually (usefully if you have other apps touching the data), create UUIDs, etc.</a:t>
-            </a:r>
-          </a:p>
-          <a:p>
-            <a:r>
-              <a:rPr lang="en-US" dirty="0"/>
-              <a:t>Regular Columns</a:t>
-            </a:r>
+            <a:endParaRPr lang="en-US" dirty="0"/>
           </a:p>
           <a:p>
             <a:pPr lvl="1"/>
             <a:r>
               <a:rPr lang="en-US" dirty="0"/>
-              <a:t>Field type of ‘column’.  Set the field-type as ‘column’ and set a </a:t>
-            </a:r>
-            <a:r>
-              <a:rPr lang="en-US" dirty="0" err="1"/>
-              <a:t>ormType</a:t>
-            </a:r>
+              <a:t>New property on the CFC to tell the ORM engine that you want to ‘persist’ the component in the database.</a:t>
+            </a:r>
+          </a:p>
+          <a:p>
+            <a:pPr lvl="1"/>
+            <a:r>
+              <a:rPr lang="en-US" dirty="0"/>
+              <a:t>Need to define the properties and give metadata as to what you plan on storing in them.  These create automatic getter/setter functions for you.</a:t>
+            </a:r>
+          </a:p>
+          <a:p>
+            <a:pPr lvl="1"/>
             <a:endParaRPr lang="en-US" dirty="0"/>
           </a:p>
           <a:p>
-            <a:pPr lvl="2"/>
-            <a:r>
-              <a:rPr lang="en-US" dirty="0" err="1"/>
-              <a:t>ORMType</a:t>
-            </a:r>
-            <a:r>
-              <a:rPr lang="en-US" dirty="0"/>
-              <a:t> can be ‘string’, ‘numeric’, ‘date’, ‘timestamp’, etc.</a:t>
-            </a:r>
-          </a:p>
-          <a:p>
-            <a:pPr lvl="1"/>
-            <a:r>
-              <a:rPr lang="en-US" dirty="0"/>
-              <a:t>You can set other restrictions on the fields as well.</a:t>
-            </a:r>
-          </a:p>
-          <a:p>
-            <a:endParaRPr lang="en-US" dirty="0"/>
-          </a:p>
-          <a:p>
-            <a:r>
-              <a:rPr lang="en-US" dirty="0"/>
-              <a:t>If you make a change to the components, make sure to do an </a:t>
-            </a:r>
-            <a:r>
-              <a:rPr lang="en-US" b="1" dirty="0" err="1"/>
-              <a:t>ormReload</a:t>
-            </a:r>
-            <a:r>
-              <a:rPr lang="en-US" b="1" dirty="0"/>
-              <a:t>()</a:t>
-            </a:r>
-            <a:r>
-              <a:rPr lang="en-US" dirty="0"/>
-              <a:t> !</a:t>
-            </a:r>
-          </a:p>
-          <a:p>
-            <a:endParaRPr lang="en-US" dirty="0"/>
+            <a:r>
+              <a:rPr lang="en-US" dirty="0"/>
+              <a:t>Once you have these done, everything is wired up for you to write data to the database!</a:t>
+            </a:r>
           </a:p>
         </p:txBody>
       </p:sp>
     </p:spTree>
     <p:extLst>
       <p:ext uri="{BB962C8B-B14F-4D97-AF65-F5344CB8AC3E}">
-        <p14:creationId xmlns:p14="http://schemas.microsoft.com/office/powerpoint/2010/main" val="2655709597"/>
+        <p14:creationId xmlns:p14="http://schemas.microsoft.com/office/powerpoint/2010/main" val="694632555"/>
       </p:ext>
     </p:extLst>
   </p:cSld>
@@ -3124,10 +3050,10 @@
       </p:grpSpPr>
       <p:sp>
         <p:nvSpPr>
-          <p:cNvPr id="4" name="Title 3">
-            <a:extLst>
-              <a:ext uri="{FF2B5EF4-FFF2-40B4-BE49-F238E27FC236}">
-                <a16:creationId xmlns:a16="http://schemas.microsoft.com/office/drawing/2014/main" id="{30CF19E4-E7D0-4D5C-B750-B59100756198}"/>
+          <p:cNvPr id="2" name="Title 1">
+            <a:extLst>
+              <a:ext uri="{FF2B5EF4-FFF2-40B4-BE49-F238E27FC236}">
+                <a16:creationId xmlns:a16="http://schemas.microsoft.com/office/drawing/2014/main" id="{BABC6D8B-0E51-4370-96D4-3AFEF4C37ECF}"/>
               </a:ext>
             </a:extLst>
           </p:cNvPr>
@@ -3145,43 +3071,44 @@
           <a:p>
             <a:r>
               <a:rPr lang="en-US" dirty="0"/>
-              <a:t>Demo 1</a:t>
-            </a:r>
-          </a:p>
-        </p:txBody>
-      </p:sp>
-      <p:sp>
-        <p:nvSpPr>
-          <p:cNvPr id="5" name="Text Placeholder 4">
-            <a:extLst>
-              <a:ext uri="{FF2B5EF4-FFF2-40B4-BE49-F238E27FC236}">
-                <a16:creationId xmlns:a16="http://schemas.microsoft.com/office/drawing/2014/main" id="{A957054C-F214-4135-95E7-8E5DEF241E6D}"/>
-              </a:ext>
-            </a:extLst>
-          </p:cNvPr>
-          <p:cNvSpPr>
-            <a:spLocks noGrp="1"/>
-          </p:cNvSpPr>
-          <p:nvPr>
-            <p:ph type="body" idx="1"/>
-          </p:nvPr>
-        </p:nvSpPr>
-        <p:spPr/>
-        <p:txBody>
-          <a:bodyPr/>
-          <a:lstStyle/>
-          <a:p>
-            <a:r>
-              <a:rPr lang="en-US" dirty="0"/>
-              <a:t>Setting up an ORM application</a:t>
-            </a:r>
-          </a:p>
-        </p:txBody>
-      </p:sp>
+              <a:t>Setup the Components</a:t>
+            </a:r>
+          </a:p>
+        </p:txBody>
+      </p:sp>
+      <p:pic>
+        <p:nvPicPr>
+          <p:cNvPr id="5" name="Content Placeholder 4">
+            <a:extLst>
+              <a:ext uri="{FF2B5EF4-FFF2-40B4-BE49-F238E27FC236}">
+                <a16:creationId xmlns:a16="http://schemas.microsoft.com/office/drawing/2014/main" id="{8E1863F6-7C88-460C-9AC9-537C76086F76}"/>
+              </a:ext>
+            </a:extLst>
+          </p:cNvPr>
+          <p:cNvPicPr>
+            <a:picLocks noGrp="1" noChangeAspect="1"/>
+          </p:cNvPicPr>
+          <p:nvPr>
+            <p:ph idx="1"/>
+          </p:nvPr>
+        </p:nvPicPr>
+        <p:blipFill>
+          <a:blip r:embed="rId2"/>
+          <a:stretch>
+            <a:fillRect/>
+          </a:stretch>
+        </p:blipFill>
+        <p:spPr>
+          <a:xfrm>
+            <a:off x="238125" y="1686874"/>
+            <a:ext cx="10561638" cy="3836676"/>
+          </a:xfrm>
+        </p:spPr>
+      </p:pic>
     </p:spTree>
     <p:extLst>
       <p:ext uri="{BB962C8B-B14F-4D97-AF65-F5344CB8AC3E}">
-        <p14:creationId xmlns:p14="http://schemas.microsoft.com/office/powerpoint/2010/main" val="3381266159"/>
+        <p14:creationId xmlns:p14="http://schemas.microsoft.com/office/powerpoint/2010/main" val="512966479"/>
       </p:ext>
     </p:extLst>
   </p:cSld>
@@ -3210,10 +3137,10 @@
       </p:grpSpPr>
       <p:sp>
         <p:nvSpPr>
-          <p:cNvPr id="6" name="Title 5">
-            <a:extLst>
-              <a:ext uri="{FF2B5EF4-FFF2-40B4-BE49-F238E27FC236}">
-                <a16:creationId xmlns:a16="http://schemas.microsoft.com/office/drawing/2014/main" id="{A24C9E18-25F3-455A-86BF-54BA3C012A4E}"/>
+          <p:cNvPr id="2" name="Title 1">
+            <a:extLst>
+              <a:ext uri="{FF2B5EF4-FFF2-40B4-BE49-F238E27FC236}">
+                <a16:creationId xmlns:a16="http://schemas.microsoft.com/office/drawing/2014/main" id="{E36813A3-EE69-45A5-B3F0-9FC4FABBFB2C}"/>
               </a:ext>
             </a:extLst>
           </p:cNvPr>
@@ -3231,35 +3158,97 @@
           <a:p>
             <a:r>
               <a:rPr lang="en-US" dirty="0"/>
-              <a:t>CRUD</a:t>
-            </a:r>
-          </a:p>
-        </p:txBody>
-      </p:sp>
-      <p:sp>
-        <p:nvSpPr>
-          <p:cNvPr id="7" name="Text Placeholder 6">
-            <a:extLst>
-              <a:ext uri="{FF2B5EF4-FFF2-40B4-BE49-F238E27FC236}">
-                <a16:creationId xmlns:a16="http://schemas.microsoft.com/office/drawing/2014/main" id="{295CC38E-D9DA-4E52-A6ED-D34697DCA922}"/>
-              </a:ext>
-            </a:extLst>
-          </p:cNvPr>
-          <p:cNvSpPr>
-            <a:spLocks noGrp="1"/>
-          </p:cNvSpPr>
-          <p:nvPr>
-            <p:ph type="body" idx="1"/>
+              <a:t>Setup the Components</a:t>
+            </a:r>
+          </a:p>
+        </p:txBody>
+      </p:sp>
+      <p:sp>
+        <p:nvSpPr>
+          <p:cNvPr id="3" name="Content Placeholder 2">
+            <a:extLst>
+              <a:ext uri="{FF2B5EF4-FFF2-40B4-BE49-F238E27FC236}">
+                <a16:creationId xmlns:a16="http://schemas.microsoft.com/office/drawing/2014/main" id="{C6723F11-74F9-452A-B538-F3246C33C99F}"/>
+              </a:ext>
+            </a:extLst>
+          </p:cNvPr>
+          <p:cNvSpPr>
+            <a:spLocks noGrp="1"/>
+          </p:cNvSpPr>
+          <p:nvPr>
+            <p:ph idx="1"/>
           </p:nvPr>
         </p:nvSpPr>
         <p:spPr/>
         <p:txBody>
-          <a:bodyPr/>
-          <a:lstStyle/>
-          <a:p>
-            <a:r>
-              <a:rPr lang="en-US" dirty="0"/>
-              <a:t>Create, Read, Update, Delete</a:t>
+          <a:bodyPr>
+            <a:normAutofit/>
+          </a:bodyPr>
+          <a:lstStyle/>
+          <a:p>
+            <a:r>
+              <a:rPr lang="en-US" dirty="0"/>
+              <a:t>Your key field for the DB.</a:t>
+            </a:r>
+          </a:p>
+          <a:p>
+            <a:pPr lvl="1"/>
+            <a:r>
+              <a:rPr lang="en-US" dirty="0"/>
+              <a:t>Field type of ‘id’.  You will need to specify the ‘generator’</a:t>
+            </a:r>
+          </a:p>
+          <a:p>
+            <a:pPr lvl="2"/>
+            <a:r>
+              <a:rPr lang="en-US" dirty="0"/>
+              <a:t>Most DBs you can use ‘native’.  This will tell hibernate to pick the best way to setup a key field, based on the DB type.</a:t>
+            </a:r>
+          </a:p>
+          <a:p>
+            <a:pPr lvl="2"/>
+            <a:r>
+              <a:rPr lang="en-US" dirty="0"/>
+              <a:t>Other generators also exist, including ones that will auto-increment, increment manually (usefully if you have other apps touching the data), create UUIDs, etc.</a:t>
+            </a:r>
+          </a:p>
+          <a:p>
+            <a:endParaRPr lang="en-US" dirty="0"/>
+          </a:p>
+          <a:p>
+            <a:r>
+              <a:rPr lang="en-US" dirty="0"/>
+              <a:t>Regular Columns</a:t>
+            </a:r>
+          </a:p>
+          <a:p>
+            <a:pPr lvl="1"/>
+            <a:r>
+              <a:rPr lang="en-US" dirty="0"/>
+              <a:t>Field type of ‘column’.  Set the field-type as ‘column’ and set a </a:t>
+            </a:r>
+            <a:r>
+              <a:rPr lang="en-US" dirty="0" err="1"/>
+              <a:t>ormType</a:t>
+            </a:r>
+            <a:endParaRPr lang="en-US" dirty="0"/>
+          </a:p>
+          <a:p>
+            <a:pPr lvl="2"/>
+            <a:r>
+              <a:rPr lang="en-US" dirty="0" err="1"/>
+              <a:t>ORMType</a:t>
+            </a:r>
+            <a:r>
+              <a:rPr lang="en-US" dirty="0"/>
+              <a:t> can be ‘string’, ‘numeric’, ‘date’, ‘timestamp’, etc.</a:t>
+            </a:r>
+          </a:p>
+          <a:p>
+            <a:pPr lvl="1"/>
+            <a:r>
+              <a:rPr lang="en-US" dirty="0"/>
+              <a:t>You can set other restrictions on the fields as well.</a:t>
             </a:r>
           </a:p>
         </p:txBody>
@@ -3267,7 +3256,7 @@
     </p:spTree>
     <p:extLst>
       <p:ext uri="{BB962C8B-B14F-4D97-AF65-F5344CB8AC3E}">
-        <p14:creationId xmlns:p14="http://schemas.microsoft.com/office/powerpoint/2010/main" val="1872907082"/>
+        <p14:creationId xmlns:p14="http://schemas.microsoft.com/office/powerpoint/2010/main" val="2655709597"/>
       </p:ext>
     </p:extLst>
   </p:cSld>
@@ -3296,10 +3285,10 @@
       </p:grpSpPr>
       <p:sp>
         <p:nvSpPr>
-          <p:cNvPr id="4" name="Title 3">
-            <a:extLst>
-              <a:ext uri="{FF2B5EF4-FFF2-40B4-BE49-F238E27FC236}">
-                <a16:creationId xmlns:a16="http://schemas.microsoft.com/office/drawing/2014/main" id="{8967EE6E-31E9-485E-A8E0-5B70A18AD2E5}"/>
+          <p:cNvPr id="2" name="Title 1">
+            <a:extLst>
+              <a:ext uri="{FF2B5EF4-FFF2-40B4-BE49-F238E27FC236}">
+                <a16:creationId xmlns:a16="http://schemas.microsoft.com/office/drawing/2014/main" id="{0BC6863D-87B9-4BE7-944F-646419765980}"/>
               </a:ext>
             </a:extLst>
           </p:cNvPr>
@@ -3317,17 +3306,17 @@
           <a:p>
             <a:r>
               <a:rPr lang="en-US" dirty="0"/>
-              <a:t>CRUD</a:t>
-            </a:r>
-          </a:p>
-        </p:txBody>
-      </p:sp>
-      <p:sp>
-        <p:nvSpPr>
-          <p:cNvPr id="5" name="Content Placeholder 4">
-            <a:extLst>
-              <a:ext uri="{FF2B5EF4-FFF2-40B4-BE49-F238E27FC236}">
-                <a16:creationId xmlns:a16="http://schemas.microsoft.com/office/drawing/2014/main" id="{257ED823-62A7-4E98-93B6-039A3D1FBFE0}"/>
+              <a:t>Setup the Components</a:t>
+            </a:r>
+          </a:p>
+        </p:txBody>
+      </p:sp>
+      <p:sp>
+        <p:nvSpPr>
+          <p:cNvPr id="3" name="Content Placeholder 2">
+            <a:extLst>
+              <a:ext uri="{FF2B5EF4-FFF2-40B4-BE49-F238E27FC236}">
+                <a16:creationId xmlns:a16="http://schemas.microsoft.com/office/drawing/2014/main" id="{A14C4F68-FCA0-4C6B-9FB9-6553847293FD}"/>
               </a:ext>
             </a:extLst>
           </p:cNvPr>
@@ -3345,77 +3334,73 @@
           <a:p>
             <a:r>
               <a:rPr lang="en-US" dirty="0"/>
-              <a:t>Now we’ve determined that the table has been setup, let’s add a new entry into the table.</a:t>
+              <a:t>Because CF caches the persistent component definitions when the application is initialized, you have two options to have your CFML engine see the changes: </a:t>
             </a:r>
           </a:p>
           <a:p>
             <a:pPr lvl="1"/>
             <a:r>
               <a:rPr lang="en-US" dirty="0"/>
-              <a:t>Remember, no SQL needed.  Everything is done by touching the properties of the component.</a:t>
+              <a:t>Restart the CF Engine</a:t>
             </a:r>
           </a:p>
           <a:p>
             <a:pPr lvl="1"/>
-            <a:endParaRPr lang="en-US" dirty="0"/>
-          </a:p>
-          <a:p>
+            <a:r>
+              <a:rPr lang="en-US" dirty="0"/>
+              <a:t>Execute the </a:t>
+            </a:r>
             <a:r>
               <a:rPr lang="en-US" b="1" i="1" dirty="0" err="1"/>
-              <a:t>entityNew</a:t>
-            </a:r>
-            <a:r>
-              <a:rPr lang="en-US" dirty="0"/>
-              <a:t> = creates a new instance of the cfc in </a:t>
-            </a:r>
-            <a:br>
-              <a:rPr lang="en-US" dirty="0"/>
-            </a:br>
-            <a:r>
-              <a:rPr lang="en-US" dirty="0"/>
-              <a:t>memory.</a:t>
-            </a:r>
-          </a:p>
-          <a:p>
-            <a:r>
-              <a:rPr lang="en-US" b="1" i="1" dirty="0" err="1"/>
-              <a:t>entitySave</a:t>
-            </a:r>
-            <a:r>
-              <a:rPr lang="en-US" dirty="0"/>
-              <a:t> = tells the ORM to commit that data to the DB.  If you don’t do this, it won’t get created.</a:t>
-            </a:r>
-          </a:p>
-          <a:p>
-            <a:pPr lvl="1"/>
-            <a:r>
-              <a:rPr lang="en-US" dirty="0"/>
-              <a:t>Entities don’t get written to disk right away – they may be cached in memory for a while first!  Issue an </a:t>
+              <a:t>ormReload</a:t>
+            </a:r>
+            <a:r>
+              <a:rPr lang="en-US" b="1" i="1" dirty="0"/>
+              <a:t>()</a:t>
+            </a:r>
+            <a:r>
+              <a:rPr lang="en-US" dirty="0"/>
+              <a:t> function.  </a:t>
+            </a:r>
+          </a:p>
+          <a:p>
+            <a:pPr lvl="2"/>
+            <a:r>
+              <a:rPr lang="en-US" dirty="0"/>
+              <a:t>The </a:t>
             </a:r>
             <a:r>
               <a:rPr lang="en-US" dirty="0" err="1"/>
-              <a:t>ormFlush</a:t>
-            </a:r>
-            <a:r>
-              <a:rPr lang="en-US" dirty="0"/>
-              <a:t>() to save everything to disk right then.</a:t>
-            </a:r>
-          </a:p>
-          <a:p>
-            <a:pPr lvl="1"/>
-            <a:endParaRPr lang="en-US" dirty="0"/>
-          </a:p>
-          <a:p>
-            <a:endParaRPr lang="en-US" dirty="0"/>
+              <a:t>ormReload</a:t>
+            </a:r>
+            <a:r>
+              <a:rPr lang="en-US" dirty="0"/>
+              <a:t>() function causes the Hibernate to be restarted, cache cleared and CFCs are reloaded.  DB changes should be realized at this point.</a:t>
+            </a:r>
+          </a:p>
+          <a:p>
+            <a:pPr lvl="2"/>
+            <a:r>
+              <a:rPr lang="en-US" dirty="0"/>
+              <a:t>Keep in mind, </a:t>
+            </a:r>
+            <a:r>
+              <a:rPr lang="en-US" dirty="0" err="1"/>
+              <a:t>ormReload</a:t>
+            </a:r>
+            <a:r>
+              <a:rPr lang="en-US" dirty="0"/>
+              <a:t> will clear out any unsaved data! </a:t>
+            </a:r>
           </a:p>
         </p:txBody>
       </p:sp>
       <p:pic>
         <p:nvPicPr>
-          <p:cNvPr id="7" name="Picture 6">
-            <a:extLst>
-              <a:ext uri="{FF2B5EF4-FFF2-40B4-BE49-F238E27FC236}">
-                <a16:creationId xmlns:a16="http://schemas.microsoft.com/office/drawing/2014/main" id="{0E75642B-9B99-4ABF-B1C0-3FD7EF390C73}"/>
+          <p:cNvPr id="5" name="Picture 4">
+            <a:extLst>
+              <a:ext uri="{FF2B5EF4-FFF2-40B4-BE49-F238E27FC236}">
+                <a16:creationId xmlns:a16="http://schemas.microsoft.com/office/drawing/2014/main" id="{271D1276-A89C-43F5-868B-E5463189C0E5}"/>
               </a:ext>
             </a:extLst>
           </p:cNvPr>
@@ -3432,14 +3417,332 @@
         </p:blipFill>
         <p:spPr>
           <a:xfrm>
-            <a:off x="8258308" y="2774916"/>
-            <a:ext cx="2832246" cy="1308167"/>
+            <a:off x="2747553" y="4334417"/>
+            <a:ext cx="6805749" cy="2074133"/>
           </a:xfrm>
           <a:prstGeom prst="rect">
             <a:avLst/>
           </a:prstGeom>
         </p:spPr>
       </p:pic>
+    </p:spTree>
+    <p:extLst>
+      <p:ext uri="{BB962C8B-B14F-4D97-AF65-F5344CB8AC3E}">
+        <p14:creationId xmlns:p14="http://schemas.microsoft.com/office/powerpoint/2010/main" val="3901705994"/>
+      </p:ext>
+    </p:extLst>
+  </p:cSld>
+  <p:clrMapOvr>
+    <a:masterClrMapping/>
+  </p:clrMapOvr>
+</p:sld>
+</file>
+
+<file path=ppt/slides/slide15.xml><?xml version="1.0" encoding="utf-8"?>
+<p:sld xmlns:a="http://schemas.openxmlformats.org/drawingml/2006/main" xmlns:r="http://schemas.openxmlformats.org/officeDocument/2006/relationships" xmlns:p="http://schemas.openxmlformats.org/presentationml/2006/main">
+  <p:cSld>
+    <p:spTree>
+      <p:nvGrpSpPr>
+        <p:cNvPr id="1" name=""/>
+        <p:cNvGrpSpPr/>
+        <p:nvPr/>
+      </p:nvGrpSpPr>
+      <p:grpSpPr>
+        <a:xfrm>
+          <a:off x="0" y="0"/>
+          <a:ext cx="0" cy="0"/>
+          <a:chOff x="0" y="0"/>
+          <a:chExt cx="0" cy="0"/>
+        </a:xfrm>
+      </p:grpSpPr>
+      <p:sp>
+        <p:nvSpPr>
+          <p:cNvPr id="4" name="Title 3">
+            <a:extLst>
+              <a:ext uri="{FF2B5EF4-FFF2-40B4-BE49-F238E27FC236}">
+                <a16:creationId xmlns:a16="http://schemas.microsoft.com/office/drawing/2014/main" id="{30CF19E4-E7D0-4D5C-B750-B59100756198}"/>
+              </a:ext>
+            </a:extLst>
+          </p:cNvPr>
+          <p:cNvSpPr>
+            <a:spLocks noGrp="1"/>
+          </p:cNvSpPr>
+          <p:nvPr>
+            <p:ph type="title"/>
+          </p:nvPr>
+        </p:nvSpPr>
+        <p:spPr/>
+        <p:txBody>
+          <a:bodyPr/>
+          <a:lstStyle/>
+          <a:p>
+            <a:r>
+              <a:rPr lang="en-US" dirty="0"/>
+              <a:t>Demo 1</a:t>
+            </a:r>
+          </a:p>
+        </p:txBody>
+      </p:sp>
+      <p:sp>
+        <p:nvSpPr>
+          <p:cNvPr id="5" name="Text Placeholder 4">
+            <a:extLst>
+              <a:ext uri="{FF2B5EF4-FFF2-40B4-BE49-F238E27FC236}">
+                <a16:creationId xmlns:a16="http://schemas.microsoft.com/office/drawing/2014/main" id="{A957054C-F214-4135-95E7-8E5DEF241E6D}"/>
+              </a:ext>
+            </a:extLst>
+          </p:cNvPr>
+          <p:cNvSpPr>
+            <a:spLocks noGrp="1"/>
+          </p:cNvSpPr>
+          <p:nvPr>
+            <p:ph type="body" idx="1"/>
+          </p:nvPr>
+        </p:nvSpPr>
+        <p:spPr/>
+        <p:txBody>
+          <a:bodyPr/>
+          <a:lstStyle/>
+          <a:p>
+            <a:r>
+              <a:rPr lang="en-US" dirty="0"/>
+              <a:t>Setting up an ORM application</a:t>
+            </a:r>
+          </a:p>
+        </p:txBody>
+      </p:sp>
+    </p:spTree>
+    <p:extLst>
+      <p:ext uri="{BB962C8B-B14F-4D97-AF65-F5344CB8AC3E}">
+        <p14:creationId xmlns:p14="http://schemas.microsoft.com/office/powerpoint/2010/main" val="3381266159"/>
+      </p:ext>
+    </p:extLst>
+  </p:cSld>
+  <p:clrMapOvr>
+    <a:masterClrMapping/>
+  </p:clrMapOvr>
+</p:sld>
+</file>
+
+<file path=ppt/slides/slide16.xml><?xml version="1.0" encoding="utf-8"?>
+<p:sld xmlns:a="http://schemas.openxmlformats.org/drawingml/2006/main" xmlns:r="http://schemas.openxmlformats.org/officeDocument/2006/relationships" xmlns:p="http://schemas.openxmlformats.org/presentationml/2006/main">
+  <p:cSld>
+    <p:spTree>
+      <p:nvGrpSpPr>
+        <p:cNvPr id="1" name=""/>
+        <p:cNvGrpSpPr/>
+        <p:nvPr/>
+      </p:nvGrpSpPr>
+      <p:grpSpPr>
+        <a:xfrm>
+          <a:off x="0" y="0"/>
+          <a:ext cx="0" cy="0"/>
+          <a:chOff x="0" y="0"/>
+          <a:chExt cx="0" cy="0"/>
+        </a:xfrm>
+      </p:grpSpPr>
+      <p:sp>
+        <p:nvSpPr>
+          <p:cNvPr id="6" name="Title 5">
+            <a:extLst>
+              <a:ext uri="{FF2B5EF4-FFF2-40B4-BE49-F238E27FC236}">
+                <a16:creationId xmlns:a16="http://schemas.microsoft.com/office/drawing/2014/main" id="{A24C9E18-25F3-455A-86BF-54BA3C012A4E}"/>
+              </a:ext>
+            </a:extLst>
+          </p:cNvPr>
+          <p:cNvSpPr>
+            <a:spLocks noGrp="1"/>
+          </p:cNvSpPr>
+          <p:nvPr>
+            <p:ph type="title"/>
+          </p:nvPr>
+        </p:nvSpPr>
+        <p:spPr/>
+        <p:txBody>
+          <a:bodyPr/>
+          <a:lstStyle/>
+          <a:p>
+            <a:r>
+              <a:rPr lang="en-US" dirty="0"/>
+              <a:t>CRUD</a:t>
+            </a:r>
+          </a:p>
+        </p:txBody>
+      </p:sp>
+      <p:sp>
+        <p:nvSpPr>
+          <p:cNvPr id="7" name="Text Placeholder 6">
+            <a:extLst>
+              <a:ext uri="{FF2B5EF4-FFF2-40B4-BE49-F238E27FC236}">
+                <a16:creationId xmlns:a16="http://schemas.microsoft.com/office/drawing/2014/main" id="{295CC38E-D9DA-4E52-A6ED-D34697DCA922}"/>
+              </a:ext>
+            </a:extLst>
+          </p:cNvPr>
+          <p:cNvSpPr>
+            <a:spLocks noGrp="1"/>
+          </p:cNvSpPr>
+          <p:nvPr>
+            <p:ph type="body" idx="1"/>
+          </p:nvPr>
+        </p:nvSpPr>
+        <p:spPr/>
+        <p:txBody>
+          <a:bodyPr/>
+          <a:lstStyle/>
+          <a:p>
+            <a:r>
+              <a:rPr lang="en-US" dirty="0"/>
+              <a:t>Create, Read, Update, Delete</a:t>
+            </a:r>
+          </a:p>
+        </p:txBody>
+      </p:sp>
+    </p:spTree>
+    <p:extLst>
+      <p:ext uri="{BB962C8B-B14F-4D97-AF65-F5344CB8AC3E}">
+        <p14:creationId xmlns:p14="http://schemas.microsoft.com/office/powerpoint/2010/main" val="1872907082"/>
+      </p:ext>
+    </p:extLst>
+  </p:cSld>
+  <p:clrMapOvr>
+    <a:masterClrMapping/>
+  </p:clrMapOvr>
+</p:sld>
+</file>
+
+<file path=ppt/slides/slide17.xml><?xml version="1.0" encoding="utf-8"?>
+<p:sld xmlns:a="http://schemas.openxmlformats.org/drawingml/2006/main" xmlns:r="http://schemas.openxmlformats.org/officeDocument/2006/relationships" xmlns:p="http://schemas.openxmlformats.org/presentationml/2006/main">
+  <p:cSld>
+    <p:spTree>
+      <p:nvGrpSpPr>
+        <p:cNvPr id="1" name=""/>
+        <p:cNvGrpSpPr/>
+        <p:nvPr/>
+      </p:nvGrpSpPr>
+      <p:grpSpPr>
+        <a:xfrm>
+          <a:off x="0" y="0"/>
+          <a:ext cx="0" cy="0"/>
+          <a:chOff x="0" y="0"/>
+          <a:chExt cx="0" cy="0"/>
+        </a:xfrm>
+      </p:grpSpPr>
+      <p:sp>
+        <p:nvSpPr>
+          <p:cNvPr id="4" name="Title 3">
+            <a:extLst>
+              <a:ext uri="{FF2B5EF4-FFF2-40B4-BE49-F238E27FC236}">
+                <a16:creationId xmlns:a16="http://schemas.microsoft.com/office/drawing/2014/main" id="{8967EE6E-31E9-485E-A8E0-5B70A18AD2E5}"/>
+              </a:ext>
+            </a:extLst>
+          </p:cNvPr>
+          <p:cNvSpPr>
+            <a:spLocks noGrp="1"/>
+          </p:cNvSpPr>
+          <p:nvPr>
+            <p:ph type="title"/>
+          </p:nvPr>
+        </p:nvSpPr>
+        <p:spPr/>
+        <p:txBody>
+          <a:bodyPr/>
+          <a:lstStyle/>
+          <a:p>
+            <a:r>
+              <a:rPr lang="en-US" dirty="0"/>
+              <a:t>CRUD</a:t>
+            </a:r>
+          </a:p>
+        </p:txBody>
+      </p:sp>
+      <p:sp>
+        <p:nvSpPr>
+          <p:cNvPr id="5" name="Content Placeholder 4">
+            <a:extLst>
+              <a:ext uri="{FF2B5EF4-FFF2-40B4-BE49-F238E27FC236}">
+                <a16:creationId xmlns:a16="http://schemas.microsoft.com/office/drawing/2014/main" id="{257ED823-62A7-4E98-93B6-039A3D1FBFE0}"/>
+              </a:ext>
+            </a:extLst>
+          </p:cNvPr>
+          <p:cNvSpPr>
+            <a:spLocks noGrp="1"/>
+          </p:cNvSpPr>
+          <p:nvPr>
+            <p:ph idx="1"/>
+          </p:nvPr>
+        </p:nvSpPr>
+        <p:spPr/>
+        <p:txBody>
+          <a:bodyPr/>
+          <a:lstStyle/>
+          <a:p>
+            <a:r>
+              <a:rPr lang="en-US" dirty="0"/>
+              <a:t>Now we’ve determined that the table has been setup, let’s add a new entry into the table.</a:t>
+            </a:r>
+          </a:p>
+          <a:p>
+            <a:pPr lvl="1"/>
+            <a:r>
+              <a:rPr lang="en-US" dirty="0"/>
+              <a:t>Remember, no SQL needed.  Everything is done by touching the properties of the component.</a:t>
+            </a:r>
+          </a:p>
+          <a:p>
+            <a:pPr lvl="1"/>
+            <a:endParaRPr lang="en-US" dirty="0"/>
+          </a:p>
+          <a:p>
+            <a:r>
+              <a:rPr lang="en-US" b="1" i="1" dirty="0" err="1"/>
+              <a:t>entityNew</a:t>
+            </a:r>
+            <a:r>
+              <a:rPr lang="en-US" dirty="0"/>
+              <a:t> = creates a new instance of the cfc in </a:t>
+            </a:r>
+            <a:br>
+              <a:rPr lang="en-US" dirty="0"/>
+            </a:br>
+            <a:r>
+              <a:rPr lang="en-US" dirty="0"/>
+              <a:t>memory.</a:t>
+            </a:r>
+          </a:p>
+          <a:p>
+            <a:r>
+              <a:rPr lang="en-US" b="1" i="1" dirty="0" err="1"/>
+              <a:t>entitySave</a:t>
+            </a:r>
+            <a:r>
+              <a:rPr lang="en-US" dirty="0"/>
+              <a:t> = tells the ORM to commit that data to the DB.  If you don’t do this, it won’t get created.</a:t>
+            </a:r>
+          </a:p>
+          <a:p>
+            <a:pPr lvl="1"/>
+            <a:r>
+              <a:rPr lang="en-US" dirty="0"/>
+              <a:t>Entities don’t get written to disk right away – they may be cached in memory for a while first!  Issue an </a:t>
+            </a:r>
+            <a:r>
+              <a:rPr lang="en-US" dirty="0" err="1"/>
+              <a:t>ormFlush</a:t>
+            </a:r>
+            <a:r>
+              <a:rPr lang="en-US" dirty="0"/>
+              <a:t>() to save everything to disk right then.</a:t>
+            </a:r>
+          </a:p>
+          <a:p>
+            <a:pPr lvl="1"/>
+            <a:endParaRPr lang="en-US" dirty="0"/>
+          </a:p>
+          <a:p>
+            <a:endParaRPr lang="en-US" dirty="0"/>
+          </a:p>
+        </p:txBody>
+      </p:sp>
     </p:spTree>
     <p:extLst>
       <p:ext uri="{BB962C8B-B14F-4D97-AF65-F5344CB8AC3E}">
@@ -3453,7 +3756,681 @@
 </p:sld>
 </file>
 
-<file path=ppt/slides/slide15.xml><?xml version="1.0" encoding="utf-8"?>
+<file path=ppt/slides/slide18.xml><?xml version="1.0" encoding="utf-8"?>
+<p:sld xmlns:a="http://schemas.openxmlformats.org/drawingml/2006/main" xmlns:r="http://schemas.openxmlformats.org/officeDocument/2006/relationships" xmlns:p="http://schemas.openxmlformats.org/presentationml/2006/main">
+  <p:cSld>
+    <p:spTree>
+      <p:nvGrpSpPr>
+        <p:cNvPr id="1" name=""/>
+        <p:cNvGrpSpPr/>
+        <p:nvPr/>
+      </p:nvGrpSpPr>
+      <p:grpSpPr>
+        <a:xfrm>
+          <a:off x="0" y="0"/>
+          <a:ext cx="0" cy="0"/>
+          <a:chOff x="0" y="0"/>
+          <a:chExt cx="0" cy="0"/>
+        </a:xfrm>
+      </p:grpSpPr>
+      <p:sp>
+        <p:nvSpPr>
+          <p:cNvPr id="2" name="Title 1">
+            <a:extLst>
+              <a:ext uri="{FF2B5EF4-FFF2-40B4-BE49-F238E27FC236}">
+                <a16:creationId xmlns:a16="http://schemas.microsoft.com/office/drawing/2014/main" id="{161DE6B6-F30C-45A3-A6D2-D91618F42F7D}"/>
+              </a:ext>
+            </a:extLst>
+          </p:cNvPr>
+          <p:cNvSpPr>
+            <a:spLocks noGrp="1"/>
+          </p:cNvSpPr>
+          <p:nvPr>
+            <p:ph type="title"/>
+          </p:nvPr>
+        </p:nvSpPr>
+        <p:spPr/>
+        <p:txBody>
+          <a:bodyPr/>
+          <a:lstStyle/>
+          <a:p>
+            <a:r>
+              <a:rPr lang="en-US" dirty="0"/>
+              <a:t>CRUD - Create</a:t>
+            </a:r>
+          </a:p>
+        </p:txBody>
+      </p:sp>
+      <p:pic>
+        <p:nvPicPr>
+          <p:cNvPr id="6" name="Content Placeholder 5">
+            <a:extLst>
+              <a:ext uri="{FF2B5EF4-FFF2-40B4-BE49-F238E27FC236}">
+                <a16:creationId xmlns:a16="http://schemas.microsoft.com/office/drawing/2014/main" id="{DA58AF22-437B-49B7-B1F9-A61CA691C2D1}"/>
+              </a:ext>
+            </a:extLst>
+          </p:cNvPr>
+          <p:cNvPicPr>
+            <a:picLocks noGrp="1" noChangeAspect="1"/>
+          </p:cNvPicPr>
+          <p:nvPr>
+            <p:ph idx="1"/>
+          </p:nvPr>
+        </p:nvPicPr>
+        <p:blipFill>
+          <a:blip r:embed="rId2"/>
+          <a:stretch>
+            <a:fillRect/>
+          </a:stretch>
+        </p:blipFill>
+        <p:spPr>
+          <a:xfrm>
+            <a:off x="238125" y="1686874"/>
+            <a:ext cx="10561638" cy="3836676"/>
+          </a:xfrm>
+        </p:spPr>
+      </p:pic>
+    </p:spTree>
+    <p:extLst>
+      <p:ext uri="{BB962C8B-B14F-4D97-AF65-F5344CB8AC3E}">
+        <p14:creationId xmlns:p14="http://schemas.microsoft.com/office/powerpoint/2010/main" val="1235462953"/>
+      </p:ext>
+    </p:extLst>
+  </p:cSld>
+  <p:clrMapOvr>
+    <a:masterClrMapping/>
+  </p:clrMapOvr>
+</p:sld>
+</file>
+
+<file path=ppt/slides/slide19.xml><?xml version="1.0" encoding="utf-8"?>
+<p:sld xmlns:a="http://schemas.openxmlformats.org/drawingml/2006/main" xmlns:r="http://schemas.openxmlformats.org/officeDocument/2006/relationships" xmlns:p="http://schemas.openxmlformats.org/presentationml/2006/main">
+  <p:cSld>
+    <p:spTree>
+      <p:nvGrpSpPr>
+        <p:cNvPr id="1" name=""/>
+        <p:cNvGrpSpPr/>
+        <p:nvPr/>
+      </p:nvGrpSpPr>
+      <p:grpSpPr>
+        <a:xfrm>
+          <a:off x="0" y="0"/>
+          <a:ext cx="0" cy="0"/>
+          <a:chOff x="0" y="0"/>
+          <a:chExt cx="0" cy="0"/>
+        </a:xfrm>
+      </p:grpSpPr>
+      <p:sp>
+        <p:nvSpPr>
+          <p:cNvPr id="2" name="Title 1">
+            <a:extLst>
+              <a:ext uri="{FF2B5EF4-FFF2-40B4-BE49-F238E27FC236}">
+                <a16:creationId xmlns:a16="http://schemas.microsoft.com/office/drawing/2014/main" id="{BA218AD0-74B2-4C0F-82A9-67757BAFBF3B}"/>
+              </a:ext>
+            </a:extLst>
+          </p:cNvPr>
+          <p:cNvSpPr>
+            <a:spLocks noGrp="1"/>
+          </p:cNvSpPr>
+          <p:nvPr>
+            <p:ph type="title"/>
+          </p:nvPr>
+        </p:nvSpPr>
+        <p:spPr/>
+        <p:txBody>
+          <a:bodyPr/>
+          <a:lstStyle/>
+          <a:p>
+            <a:r>
+              <a:rPr lang="en-US" dirty="0"/>
+              <a:t>CRUD - Read</a:t>
+            </a:r>
+          </a:p>
+        </p:txBody>
+      </p:sp>
+      <p:sp>
+        <p:nvSpPr>
+          <p:cNvPr id="3" name="Content Placeholder 2">
+            <a:extLst>
+              <a:ext uri="{FF2B5EF4-FFF2-40B4-BE49-F238E27FC236}">
+                <a16:creationId xmlns:a16="http://schemas.microsoft.com/office/drawing/2014/main" id="{EAB6BD1B-B3B2-4C70-B512-A6CC9AF972E0}"/>
+              </a:ext>
+            </a:extLst>
+          </p:cNvPr>
+          <p:cNvSpPr>
+            <a:spLocks noGrp="1"/>
+          </p:cNvSpPr>
+          <p:nvPr>
+            <p:ph idx="1"/>
+          </p:nvPr>
+        </p:nvSpPr>
+        <p:spPr/>
+        <p:txBody>
+          <a:bodyPr/>
+          <a:lstStyle/>
+          <a:p>
+            <a:r>
+              <a:rPr lang="en-US" dirty="0"/>
+              <a:t>To get items out of the database, you will need to use one of the </a:t>
+            </a:r>
+            <a:r>
+              <a:rPr lang="en-US" dirty="0" err="1"/>
+              <a:t>EntityLoad</a:t>
+            </a:r>
+            <a:r>
+              <a:rPr lang="en-US" dirty="0"/>
+              <a:t> functions :</a:t>
+            </a:r>
+          </a:p>
+          <a:p>
+            <a:pPr lvl="1"/>
+            <a:r>
+              <a:rPr lang="en-US" b="1" dirty="0" err="1"/>
+              <a:t>entityLoad</a:t>
+            </a:r>
+            <a:r>
+              <a:rPr lang="en-US" dirty="0"/>
+              <a:t>(“</a:t>
+            </a:r>
+            <a:r>
+              <a:rPr lang="en-US" dirty="0" err="1"/>
+              <a:t>componentName</a:t>
+            </a:r>
+            <a:r>
+              <a:rPr lang="en-US" dirty="0"/>
+              <a:t>”);      </a:t>
+            </a:r>
+            <a:r>
+              <a:rPr lang="en-US" i="1" dirty="0"/>
+              <a:t>// returns an array of components</a:t>
+            </a:r>
+          </a:p>
+          <a:p>
+            <a:pPr lvl="1"/>
+            <a:r>
+              <a:rPr lang="en-US" b="1" dirty="0" err="1"/>
+              <a:t>entityLoadByPK</a:t>
+            </a:r>
+            <a:r>
+              <a:rPr lang="en-US" dirty="0"/>
+              <a:t>(“</a:t>
+            </a:r>
+            <a:r>
+              <a:rPr lang="en-US" dirty="0" err="1"/>
+              <a:t>componentName</a:t>
+            </a:r>
+            <a:r>
+              <a:rPr lang="en-US" dirty="0"/>
+              <a:t>”,id);   </a:t>
+            </a:r>
+            <a:r>
+              <a:rPr lang="en-US" i="1" dirty="0"/>
+              <a:t>// returns a single component</a:t>
+            </a:r>
+          </a:p>
+          <a:p>
+            <a:pPr lvl="1"/>
+            <a:r>
+              <a:rPr lang="en-US" b="1" dirty="0" err="1"/>
+              <a:t>entityLoad</a:t>
+            </a:r>
+            <a:r>
+              <a:rPr lang="en-US" dirty="0"/>
+              <a:t>(“</a:t>
+            </a:r>
+            <a:r>
+              <a:rPr lang="en-US" dirty="0" err="1"/>
+              <a:t>componentName</a:t>
+            </a:r>
+            <a:r>
+              <a:rPr lang="en-US" dirty="0"/>
+              <a:t>”, {filter}, unique);  </a:t>
+            </a:r>
+            <a:r>
+              <a:rPr lang="en-US" i="1" dirty="0"/>
+              <a:t>// returns an array, unless unique is set to true.</a:t>
+            </a:r>
+          </a:p>
+          <a:p>
+            <a:endParaRPr lang="en-US" dirty="0"/>
+          </a:p>
+          <a:p>
+            <a:r>
+              <a:rPr lang="en-US" dirty="0"/>
+              <a:t>Unlike a &lt;</a:t>
+            </a:r>
+            <a:r>
+              <a:rPr lang="en-US" dirty="0" err="1"/>
+              <a:t>cfquery</a:t>
+            </a:r>
+            <a:r>
+              <a:rPr lang="en-US" dirty="0"/>
+              <a:t>&gt; command, you will get an Array back, not a query.</a:t>
+            </a:r>
+          </a:p>
+          <a:p>
+            <a:pPr lvl="1"/>
+            <a:r>
+              <a:rPr lang="en-US" dirty="0"/>
+              <a:t>You can convert an array into a query if you need using the </a:t>
+            </a:r>
+            <a:r>
+              <a:rPr lang="en-US" b="1" i="1" dirty="0" err="1"/>
+              <a:t>entityToQuery</a:t>
+            </a:r>
+            <a:r>
+              <a:rPr lang="en-US" b="1" i="1" dirty="0"/>
+              <a:t>(entity)</a:t>
+            </a:r>
+            <a:r>
+              <a:rPr lang="en-US" dirty="0"/>
+              <a:t> function. </a:t>
+            </a:r>
+          </a:p>
+        </p:txBody>
+      </p:sp>
+    </p:spTree>
+    <p:extLst>
+      <p:ext uri="{BB962C8B-B14F-4D97-AF65-F5344CB8AC3E}">
+        <p14:creationId xmlns:p14="http://schemas.microsoft.com/office/powerpoint/2010/main" val="3903619779"/>
+      </p:ext>
+    </p:extLst>
+  </p:cSld>
+  <p:clrMapOvr>
+    <a:masterClrMapping/>
+  </p:clrMapOvr>
+</p:sld>
+</file>
+
+<file path=ppt/slides/slide2.xml><?xml version="1.0" encoding="utf-8"?>
+<p:sld xmlns:a="http://schemas.openxmlformats.org/drawingml/2006/main" xmlns:r="http://schemas.openxmlformats.org/officeDocument/2006/relationships" xmlns:p="http://schemas.openxmlformats.org/presentationml/2006/main">
+  <p:cSld>
+    <p:spTree>
+      <p:nvGrpSpPr>
+        <p:cNvPr id="1" name=""/>
+        <p:cNvGrpSpPr/>
+        <p:nvPr/>
+      </p:nvGrpSpPr>
+      <p:grpSpPr>
+        <a:xfrm>
+          <a:off x="0" y="0"/>
+          <a:ext cx="0" cy="0"/>
+          <a:chOff x="0" y="0"/>
+          <a:chExt cx="0" cy="0"/>
+        </a:xfrm>
+      </p:grpSpPr>
+      <p:sp>
+        <p:nvSpPr>
+          <p:cNvPr id="2" name="Title 1">
+            <a:extLst>
+              <a:ext uri="{FF2B5EF4-FFF2-40B4-BE49-F238E27FC236}">
+                <a16:creationId xmlns:a16="http://schemas.microsoft.com/office/drawing/2014/main" id="{76D48118-D7E0-4A4B-AB15-AEC9E7539AC4}"/>
+              </a:ext>
+            </a:extLst>
+          </p:cNvPr>
+          <p:cNvSpPr>
+            <a:spLocks noGrp="1"/>
+          </p:cNvSpPr>
+          <p:nvPr>
+            <p:ph type="title"/>
+          </p:nvPr>
+        </p:nvSpPr>
+        <p:spPr/>
+        <p:txBody>
+          <a:bodyPr/>
+          <a:lstStyle/>
+          <a:p>
+            <a:r>
+              <a:rPr lang="en-US" dirty="0"/>
+              <a:t>Agenda</a:t>
+            </a:r>
+          </a:p>
+        </p:txBody>
+      </p:sp>
+      <p:sp>
+        <p:nvSpPr>
+          <p:cNvPr id="3" name="Content Placeholder 2">
+            <a:extLst>
+              <a:ext uri="{FF2B5EF4-FFF2-40B4-BE49-F238E27FC236}">
+                <a16:creationId xmlns:a16="http://schemas.microsoft.com/office/drawing/2014/main" id="{AE323ABF-E4A3-41A3-B5BA-D904386C4272}"/>
+              </a:ext>
+            </a:extLst>
+          </p:cNvPr>
+          <p:cNvSpPr>
+            <a:spLocks noGrp="1"/>
+          </p:cNvSpPr>
+          <p:nvPr>
+            <p:ph idx="1"/>
+          </p:nvPr>
+        </p:nvSpPr>
+        <p:spPr/>
+        <p:txBody>
+          <a:bodyPr/>
+          <a:lstStyle/>
+          <a:p>
+            <a:r>
+              <a:rPr lang="en-US" dirty="0"/>
+              <a:t>What is an ORM system?</a:t>
+            </a:r>
+          </a:p>
+          <a:p>
+            <a:r>
+              <a:rPr lang="en-US" dirty="0"/>
+              <a:t>Pieces and Parts to using ORM in CFML</a:t>
+            </a:r>
+          </a:p>
+          <a:p>
+            <a:r>
+              <a:rPr lang="en-US" dirty="0"/>
+              <a:t>Basic CRUD operations</a:t>
+            </a:r>
+          </a:p>
+          <a:p>
+            <a:r>
+              <a:rPr lang="en-US" dirty="0"/>
+              <a:t>Building Relationships</a:t>
+            </a:r>
+          </a:p>
+          <a:p>
+            <a:r>
+              <a:rPr lang="en-US" dirty="0"/>
+              <a:t>HQL, grouping and computed rows</a:t>
+            </a:r>
+          </a:p>
+          <a:p>
+            <a:r>
+              <a:rPr lang="en-US" dirty="0"/>
+              <a:t>Optimizations, debugging and gotchas</a:t>
+            </a:r>
+          </a:p>
+        </p:txBody>
+      </p:sp>
+    </p:spTree>
+    <p:extLst>
+      <p:ext uri="{BB962C8B-B14F-4D97-AF65-F5344CB8AC3E}">
+        <p14:creationId xmlns:p14="http://schemas.microsoft.com/office/powerpoint/2010/main" val="4083540317"/>
+      </p:ext>
+    </p:extLst>
+  </p:cSld>
+  <p:clrMapOvr>
+    <a:masterClrMapping/>
+  </p:clrMapOvr>
+</p:sld>
+</file>
+
+<file path=ppt/slides/slide20.xml><?xml version="1.0" encoding="utf-8"?>
+<p:sld xmlns:a="http://schemas.openxmlformats.org/drawingml/2006/main" xmlns:r="http://schemas.openxmlformats.org/officeDocument/2006/relationships" xmlns:p="http://schemas.openxmlformats.org/presentationml/2006/main">
+  <p:cSld>
+    <p:spTree>
+      <p:nvGrpSpPr>
+        <p:cNvPr id="1" name=""/>
+        <p:cNvGrpSpPr/>
+        <p:nvPr/>
+      </p:nvGrpSpPr>
+      <p:grpSpPr>
+        <a:xfrm>
+          <a:off x="0" y="0"/>
+          <a:ext cx="0" cy="0"/>
+          <a:chOff x="0" y="0"/>
+          <a:chExt cx="0" cy="0"/>
+        </a:xfrm>
+      </p:grpSpPr>
+      <p:sp>
+        <p:nvSpPr>
+          <p:cNvPr id="2" name="Title 1">
+            <a:extLst>
+              <a:ext uri="{FF2B5EF4-FFF2-40B4-BE49-F238E27FC236}">
+                <a16:creationId xmlns:a16="http://schemas.microsoft.com/office/drawing/2014/main" id="{3A2C4485-709D-3B56-2A06-E6CD1C06B078}"/>
+              </a:ext>
+            </a:extLst>
+          </p:cNvPr>
+          <p:cNvSpPr>
+            <a:spLocks noGrp="1"/>
+          </p:cNvSpPr>
+          <p:nvPr>
+            <p:ph type="title"/>
+          </p:nvPr>
+        </p:nvSpPr>
+        <p:spPr/>
+        <p:txBody>
+          <a:bodyPr/>
+          <a:lstStyle/>
+          <a:p>
+            <a:r>
+              <a:rPr lang="en-US" dirty="0"/>
+              <a:t>CRUD - Read</a:t>
+            </a:r>
+          </a:p>
+        </p:txBody>
+      </p:sp>
+      <p:pic>
+        <p:nvPicPr>
+          <p:cNvPr id="5" name="Content Placeholder 4">
+            <a:extLst>
+              <a:ext uri="{FF2B5EF4-FFF2-40B4-BE49-F238E27FC236}">
+                <a16:creationId xmlns:a16="http://schemas.microsoft.com/office/drawing/2014/main" id="{AF8678C0-5A5B-83F6-2D9C-E19B8A8D27BC}"/>
+              </a:ext>
+            </a:extLst>
+          </p:cNvPr>
+          <p:cNvPicPr>
+            <a:picLocks noGrp="1" noChangeAspect="1"/>
+          </p:cNvPicPr>
+          <p:nvPr>
+            <p:ph idx="1"/>
+          </p:nvPr>
+        </p:nvPicPr>
+        <p:blipFill>
+          <a:blip r:embed="rId2"/>
+          <a:stretch>
+            <a:fillRect/>
+          </a:stretch>
+        </p:blipFill>
+        <p:spPr>
+          <a:xfrm>
+            <a:off x="1949723" y="1339850"/>
+            <a:ext cx="7138441" cy="4530725"/>
+          </a:xfrm>
+        </p:spPr>
+      </p:pic>
+    </p:spTree>
+    <p:extLst>
+      <p:ext uri="{BB962C8B-B14F-4D97-AF65-F5344CB8AC3E}">
+        <p14:creationId xmlns:p14="http://schemas.microsoft.com/office/powerpoint/2010/main" val="1619135173"/>
+      </p:ext>
+    </p:extLst>
+  </p:cSld>
+  <p:clrMapOvr>
+    <a:masterClrMapping/>
+  </p:clrMapOvr>
+</p:sld>
+</file>
+
+<file path=ppt/slides/slide21.xml><?xml version="1.0" encoding="utf-8"?>
+<p:sld xmlns:a="http://schemas.openxmlformats.org/drawingml/2006/main" xmlns:r="http://schemas.openxmlformats.org/officeDocument/2006/relationships" xmlns:p="http://schemas.openxmlformats.org/presentationml/2006/main">
+  <p:cSld>
+    <p:spTree>
+      <p:nvGrpSpPr>
+        <p:cNvPr id="1" name=""/>
+        <p:cNvGrpSpPr/>
+        <p:nvPr/>
+      </p:nvGrpSpPr>
+      <p:grpSpPr>
+        <a:xfrm>
+          <a:off x="0" y="0"/>
+          <a:ext cx="0" cy="0"/>
+          <a:chOff x="0" y="0"/>
+          <a:chExt cx="0" cy="0"/>
+        </a:xfrm>
+      </p:grpSpPr>
+      <p:sp>
+        <p:nvSpPr>
+          <p:cNvPr id="2" name="Title 1">
+            <a:extLst>
+              <a:ext uri="{FF2B5EF4-FFF2-40B4-BE49-F238E27FC236}">
+                <a16:creationId xmlns:a16="http://schemas.microsoft.com/office/drawing/2014/main" id="{961B34B9-CDE5-B624-B686-1F2455382C90}"/>
+              </a:ext>
+            </a:extLst>
+          </p:cNvPr>
+          <p:cNvSpPr>
+            <a:spLocks noGrp="1"/>
+          </p:cNvSpPr>
+          <p:nvPr>
+            <p:ph type="title"/>
+          </p:nvPr>
+        </p:nvSpPr>
+        <p:spPr/>
+        <p:txBody>
+          <a:bodyPr/>
+          <a:lstStyle/>
+          <a:p>
+            <a:r>
+              <a:rPr lang="en-US" dirty="0"/>
+              <a:t>CRUD - Read</a:t>
+            </a:r>
+          </a:p>
+        </p:txBody>
+      </p:sp>
+      <p:sp>
+        <p:nvSpPr>
+          <p:cNvPr id="3" name="Content Placeholder 2">
+            <a:extLst>
+              <a:ext uri="{FF2B5EF4-FFF2-40B4-BE49-F238E27FC236}">
+                <a16:creationId xmlns:a16="http://schemas.microsoft.com/office/drawing/2014/main" id="{D58A8E86-4FA5-254D-3A90-F940EE490DC3}"/>
+              </a:ext>
+            </a:extLst>
+          </p:cNvPr>
+          <p:cNvSpPr>
+            <a:spLocks noGrp="1"/>
+          </p:cNvSpPr>
+          <p:nvPr>
+            <p:ph idx="1"/>
+          </p:nvPr>
+        </p:nvSpPr>
+        <p:spPr/>
+        <p:txBody>
+          <a:bodyPr/>
+          <a:lstStyle/>
+          <a:p>
+            <a:r>
+              <a:rPr lang="en-US" dirty="0"/>
+              <a:t>You can also filter (where clause) using the </a:t>
+            </a:r>
+            <a:r>
+              <a:rPr lang="en-US" b="1" dirty="0" err="1"/>
+              <a:t>entityLoad</a:t>
+            </a:r>
+            <a:r>
+              <a:rPr lang="en-US" b="1" dirty="0"/>
+              <a:t>()</a:t>
+            </a:r>
+            <a:r>
+              <a:rPr lang="en-US" dirty="0"/>
+              <a:t> function.</a:t>
+            </a:r>
+          </a:p>
+        </p:txBody>
+      </p:sp>
+    </p:spTree>
+    <p:extLst>
+      <p:ext uri="{BB962C8B-B14F-4D97-AF65-F5344CB8AC3E}">
+        <p14:creationId xmlns:p14="http://schemas.microsoft.com/office/powerpoint/2010/main" val="3317291236"/>
+      </p:ext>
+    </p:extLst>
+  </p:cSld>
+  <p:clrMapOvr>
+    <a:masterClrMapping/>
+  </p:clrMapOvr>
+</p:sld>
+</file>
+
+<file path=ppt/slides/slide22.xml><?xml version="1.0" encoding="utf-8"?>
+<p:sld xmlns:a="http://schemas.openxmlformats.org/drawingml/2006/main" xmlns:r="http://schemas.openxmlformats.org/officeDocument/2006/relationships" xmlns:p="http://schemas.openxmlformats.org/presentationml/2006/main">
+  <p:cSld>
+    <p:spTree>
+      <p:nvGrpSpPr>
+        <p:cNvPr id="1" name=""/>
+        <p:cNvGrpSpPr/>
+        <p:nvPr/>
+      </p:nvGrpSpPr>
+      <p:grpSpPr>
+        <a:xfrm>
+          <a:off x="0" y="0"/>
+          <a:ext cx="0" cy="0"/>
+          <a:chOff x="0" y="0"/>
+          <a:chExt cx="0" cy="0"/>
+        </a:xfrm>
+      </p:grpSpPr>
+      <p:sp>
+        <p:nvSpPr>
+          <p:cNvPr id="2" name="Title 1">
+            <a:extLst>
+              <a:ext uri="{FF2B5EF4-FFF2-40B4-BE49-F238E27FC236}">
+                <a16:creationId xmlns:a16="http://schemas.microsoft.com/office/drawing/2014/main" id="{F999F883-ABFF-43A2-B807-460746849F93}"/>
+              </a:ext>
+            </a:extLst>
+          </p:cNvPr>
+          <p:cNvSpPr>
+            <a:spLocks noGrp="1"/>
+          </p:cNvSpPr>
+          <p:nvPr>
+            <p:ph type="title"/>
+          </p:nvPr>
+        </p:nvSpPr>
+        <p:spPr/>
+        <p:txBody>
+          <a:bodyPr/>
+          <a:lstStyle/>
+          <a:p>
+            <a:r>
+              <a:rPr lang="en-US" dirty="0"/>
+              <a:t>CRUD - Update</a:t>
+            </a:r>
+          </a:p>
+        </p:txBody>
+      </p:sp>
+      <p:pic>
+        <p:nvPicPr>
+          <p:cNvPr id="5" name="Content Placeholder 4">
+            <a:extLst>
+              <a:ext uri="{FF2B5EF4-FFF2-40B4-BE49-F238E27FC236}">
+                <a16:creationId xmlns:a16="http://schemas.microsoft.com/office/drawing/2014/main" id="{A4FEC9D8-6206-470D-AA31-2077C7D90F30}"/>
+              </a:ext>
+            </a:extLst>
+          </p:cNvPr>
+          <p:cNvPicPr>
+            <a:picLocks noGrp="1" noChangeAspect="1"/>
+          </p:cNvPicPr>
+          <p:nvPr>
+            <p:ph idx="1"/>
+          </p:nvPr>
+        </p:nvPicPr>
+        <p:blipFill>
+          <a:blip r:embed="rId2"/>
+          <a:stretch>
+            <a:fillRect/>
+          </a:stretch>
+        </p:blipFill>
+        <p:spPr>
+          <a:xfrm>
+            <a:off x="238125" y="1686874"/>
+            <a:ext cx="10561638" cy="3836676"/>
+          </a:xfrm>
+        </p:spPr>
+      </p:pic>
+    </p:spTree>
+    <p:extLst>
+      <p:ext uri="{BB962C8B-B14F-4D97-AF65-F5344CB8AC3E}">
+        <p14:creationId xmlns:p14="http://schemas.microsoft.com/office/powerpoint/2010/main" val="3565231334"/>
+      </p:ext>
+    </p:extLst>
+  </p:cSld>
+  <p:clrMapOvr>
+    <a:masterClrMapping/>
+  </p:clrMapOvr>
+</p:sld>
+</file>
+
+<file path=ppt/slides/slide23.xml><?xml version="1.0" encoding="utf-8"?>
 <p:sld xmlns:a="http://schemas.openxmlformats.org/drawingml/2006/main" xmlns:r="http://schemas.openxmlformats.org/officeDocument/2006/relationships" xmlns:p="http://schemas.openxmlformats.org/presentationml/2006/main">
   <p:cSld>
     <p:spTree>
@@ -3663,7 +4640,7 @@
 </p:sld>
 </file>
 
-<file path=ppt/slides/slide16.xml><?xml version="1.0" encoding="utf-8"?>
+<file path=ppt/slides/slide24.xml><?xml version="1.0" encoding="utf-8"?>
 <p:sld xmlns:a="http://schemas.openxmlformats.org/drawingml/2006/main" xmlns:r="http://schemas.openxmlformats.org/officeDocument/2006/relationships" xmlns:p="http://schemas.openxmlformats.org/presentationml/2006/main">
   <p:cSld>
     <p:spTree>
@@ -3798,11 +4775,7 @@
           <a:p>
             <a:r>
               <a:rPr lang="en-US" dirty="0"/>
-              <a:t>You would then display the data as any other array.  CFLOOP</a:t>
-            </a:r>
-            <a:r>
-              <a:rPr lang="en-US"/>
-              <a:t>, etc.</a:t>
+              <a:t>You would then display the data as any other array.  CFLOOP, etc.</a:t>
             </a:r>
           </a:p>
           <a:p>
@@ -3818,122 +4791,6 @@
     <p:extLst>
       <p:ext uri="{BB962C8B-B14F-4D97-AF65-F5344CB8AC3E}">
         <p14:creationId xmlns:p14="http://schemas.microsoft.com/office/powerpoint/2010/main" val="913696550"/>
-      </p:ext>
-    </p:extLst>
-  </p:cSld>
-  <p:clrMapOvr>
-    <a:masterClrMapping/>
-  </p:clrMapOvr>
-</p:sld>
-</file>
-
-<file path=ppt/slides/slide2.xml><?xml version="1.0" encoding="utf-8"?>
-<p:sld xmlns:a="http://schemas.openxmlformats.org/drawingml/2006/main" xmlns:r="http://schemas.openxmlformats.org/officeDocument/2006/relationships" xmlns:p="http://schemas.openxmlformats.org/presentationml/2006/main">
-  <p:cSld>
-    <p:spTree>
-      <p:nvGrpSpPr>
-        <p:cNvPr id="1" name=""/>
-        <p:cNvGrpSpPr/>
-        <p:nvPr/>
-      </p:nvGrpSpPr>
-      <p:grpSpPr>
-        <a:xfrm>
-          <a:off x="0" y="0"/>
-          <a:ext cx="0" cy="0"/>
-          <a:chOff x="0" y="0"/>
-          <a:chExt cx="0" cy="0"/>
-        </a:xfrm>
-      </p:grpSpPr>
-      <p:sp>
-        <p:nvSpPr>
-          <p:cNvPr id="2" name="Title 1">
-            <a:extLst>
-              <a:ext uri="{FF2B5EF4-FFF2-40B4-BE49-F238E27FC236}">
-                <a16:creationId xmlns:a16="http://schemas.microsoft.com/office/drawing/2014/main" id="{76D48118-D7E0-4A4B-AB15-AEC9E7539AC4}"/>
-              </a:ext>
-            </a:extLst>
-          </p:cNvPr>
-          <p:cNvSpPr>
-            <a:spLocks noGrp="1"/>
-          </p:cNvSpPr>
-          <p:nvPr>
-            <p:ph type="title"/>
-          </p:nvPr>
-        </p:nvSpPr>
-        <p:spPr/>
-        <p:txBody>
-          <a:bodyPr/>
-          <a:lstStyle/>
-          <a:p>
-            <a:r>
-              <a:rPr lang="en-US" dirty="0"/>
-              <a:t>Agenda</a:t>
-            </a:r>
-          </a:p>
-        </p:txBody>
-      </p:sp>
-      <p:sp>
-        <p:nvSpPr>
-          <p:cNvPr id="3" name="Content Placeholder 2">
-            <a:extLst>
-              <a:ext uri="{FF2B5EF4-FFF2-40B4-BE49-F238E27FC236}">
-                <a16:creationId xmlns:a16="http://schemas.microsoft.com/office/drawing/2014/main" id="{AE323ABF-E4A3-41A3-B5BA-D904386C4272}"/>
-              </a:ext>
-            </a:extLst>
-          </p:cNvPr>
-          <p:cNvSpPr>
-            <a:spLocks noGrp="1"/>
-          </p:cNvSpPr>
-          <p:nvPr>
-            <p:ph idx="1"/>
-          </p:nvPr>
-        </p:nvSpPr>
-        <p:spPr/>
-        <p:txBody>
-          <a:bodyPr/>
-          <a:lstStyle/>
-          <a:p>
-            <a:r>
-              <a:rPr lang="en-US" dirty="0"/>
-              <a:t>What is an ORM system?</a:t>
-            </a:r>
-          </a:p>
-          <a:p>
-            <a:r>
-              <a:rPr lang="en-US" dirty="0"/>
-              <a:t>Pieces and Parts to using ORM in CFML</a:t>
-            </a:r>
-          </a:p>
-          <a:p>
-            <a:r>
-              <a:rPr lang="en-US" dirty="0"/>
-              <a:t>Basic CRUD operations</a:t>
-            </a:r>
-          </a:p>
-          <a:p>
-            <a:r>
-              <a:rPr lang="en-US" dirty="0"/>
-              <a:t>Building Relationships</a:t>
-            </a:r>
-          </a:p>
-          <a:p>
-            <a:r>
-              <a:rPr lang="en-US" dirty="0"/>
-              <a:t>HQL, grouping and computed rows</a:t>
-            </a:r>
-          </a:p>
-          <a:p>
-            <a:r>
-              <a:rPr lang="en-US" dirty="0"/>
-              <a:t>Optimizations, debugging and gotchas</a:t>
-            </a:r>
-          </a:p>
-        </p:txBody>
-      </p:sp>
-    </p:spTree>
-    <p:extLst>
-      <p:ext uri="{BB962C8B-B14F-4D97-AF65-F5344CB8AC3E}">
-        <p14:creationId xmlns:p14="http://schemas.microsoft.com/office/powerpoint/2010/main" val="4083540317"/>
       </p:ext>
     </p:extLst>
   </p:cSld>
@@ -4006,7 +4863,9 @@
         </p:nvSpPr>
         <p:spPr/>
         <p:txBody>
-          <a:bodyPr/>
+          <a:bodyPr>
+            <a:normAutofit lnSpcReduction="10000"/>
+          </a:bodyPr>
           <a:lstStyle/>
           <a:p>
             <a:r>
@@ -4023,6 +4882,13 @@
               <a:t>https://github.com/quetwo/orm-preso</a:t>
             </a:r>
             <a:endParaRPr lang="en-US" dirty="0"/>
+          </a:p>
+          <a:p>
+            <a:pPr lvl="1"/>
+            <a:r>
+              <a:rPr lang="en-US" dirty="0"/>
+              <a:t>Take a look at the README for instructions on getting started.  You have a few minutes while we talk about the basics.</a:t>
+            </a:r>
           </a:p>
           <a:p>
             <a:pPr lvl="1"/>
@@ -4137,7 +5003,7 @@
           <a:p>
             <a:r>
               <a:rPr lang="en-US" dirty="0"/>
-              <a:t>CF programmer since the mid 90’s – started with CF 4</a:t>
+              <a:t>CF programmer since the mid 90’s – started with CF 4.0.1</a:t>
             </a:r>
           </a:p>
           <a:p>
@@ -4378,7 +5244,7 @@
             </a:r>
             <a:r>
               <a:rPr lang="en-US" dirty="0"/>
-              <a:t> not only in memory, but in a database.  </a:t>
+              <a:t> not only in memory, but in a database.  Data from the DB is also cached!</a:t>
             </a:r>
           </a:p>
           <a:p>
@@ -4552,7 +5418,7 @@
             <a:pPr lvl="1"/>
             <a:r>
               <a:rPr lang="en-US" dirty="0"/>
-              <a:t>Mura CMS ORM</a:t>
+              <a:t>Mura / Masa CMS ORM</a:t>
             </a:r>
           </a:p>
         </p:txBody>

</xml_diff>